<commit_message>
Deploying to gh-pages from @ ManuelePasini/slides-markdown@1c02a65275da10418c7d3ad38c915c627a4f7237 🚀
</commit_message>
<xml_diff>
--- a/dataplat_seminar.pptx
+++ b/dataplat_seminar.pptx
@@ -6,6 +6,7 @@
   </p:sldMasterIdLst>
   <p:sldIdLst>
     <p:sldId id="256" r:id="rId2"/>
+    <p:sldId id="257" r:id="rId3"/>
   </p:sldIdLst>
   <p:sldSz cx="9144000" cy="5143500" type="screen16x9"/>
   <p:notesSz cx="6858000" cy="9144000"/>
@@ -3122,6 +3123,101 @@
 </file>
 
 <file path=ppt/slides/slide1.xml><?xml version="1.0" encoding="utf-8"?>
+<p:sld xmlns:a="http://schemas.openxmlformats.org/drawingml/2006/main" xmlns:r="http://schemas.openxmlformats.org/officeDocument/2006/relationships" xmlns:p="http://schemas.openxmlformats.org/presentationml/2006/main">
+  <p:cSld>
+    <p:spTree>
+      <p:nvGrpSpPr>
+        <p:cNvPr id="1" name=""/>
+        <p:cNvGrpSpPr/>
+        <p:nvPr/>
+      </p:nvGrpSpPr>
+      <p:grpSpPr>
+        <a:xfrm>
+          <a:off x="0" y="0"/>
+          <a:ext cx="0" cy="0"/>
+          <a:chOff x="0" y="0"/>
+          <a:chExt cx="0" cy="0"/>
+        </a:xfrm>
+      </p:grpSpPr>
+      <p:sp>
+        <p:nvSpPr>
+          <p:cNvPr id="2" name="Title 1"/>
+          <p:cNvSpPr>
+            <a:spLocks noGrp="1"/>
+          </p:cNvSpPr>
+          <p:nvPr>
+            <p:ph type="title"/>
+          </p:nvPr>
+        </p:nvSpPr>
+        <p:spPr/>
+        <p:txBody>
+          <a:bodyPr/>
+          <a:lstStyle/>
+          <a:p>
+            <a:pPr lvl="0" indent="0" marL="0">
+              <a:buNone/>
+            </a:pPr>
+            <a:r>
+              <a:rPr/>
+              <a:t>A seminar on Data Platforms</a:t>
+            </a:r>
+          </a:p>
+        </p:txBody>
+      </p:sp>
+      <p:sp>
+        <p:nvSpPr>
+          <p:cNvPr id="3" name="Content Placeholder 2"/>
+          <p:cNvSpPr>
+            <a:spLocks noGrp="1"/>
+          </p:cNvSpPr>
+          <p:nvPr>
+            <p:ph idx="1"/>
+          </p:nvPr>
+        </p:nvSpPr>
+        <p:spPr/>
+        <p:txBody>
+          <a:bodyPr/>
+          <a:lstStyle/>
+          <a:p>
+            <a:pPr lvl="0" indent="0" marL="0">
+              <a:buNone/>
+            </a:pPr>
+            <a:r>
+              <a:rPr/>
+              <a:t>Manuele Pasini</a:t>
+            </a:r>
+          </a:p>
+          <a:p>
+            <a:pPr lvl="0" indent="0" marL="0">
+              <a:buNone/>
+            </a:pPr>
+            <a:r>
+              <a:rPr i="1"/>
+              <a:t>manuele.pasini@unibo.it</a:t>
+            </a:r>
+          </a:p>
+          <a:p>
+            <a:pPr lvl="0" indent="0" marL="0">
+              <a:buNone/>
+            </a:pPr>
+            <a:r>
+              <a:rPr/>
+              <a:t>09/12/2025</a:t>
+            </a:r>
+          </a:p>
+          <a:p>
+            <a:pPr lvl="0" indent="0" marL="0">
+              <a:buNone/>
+            </a:pPr>
+          </a:p>
+        </p:txBody>
+      </p:sp>
+    </p:spTree>
+  </p:cSld>
+</p:sld>
+</file>
+
+<file path=ppt/slides/slide2.xml><?xml version="1.0" encoding="utf-8"?>
 <p:sld xmlns:a="http://schemas.openxmlformats.org/drawingml/2006/main" xmlns:r="http://schemas.openxmlformats.org/officeDocument/2006/relationships" xmlns:p="http://schemas.openxmlformats.org/presentationml/2006/main">
   <p:cSld>
     <p:spTree>

</xml_diff>

<commit_message>
Deploying to gh-pages from @ ManuelePasini/slides-markdown@42c69fa260cd65d1a9fac210b9a4b4ca03022948 🚀
</commit_message>
<xml_diff>
--- a/dataplat_seminar.pptx
+++ b/dataplat_seminar.pptx
@@ -7,6 +7,8 @@
   <p:sldIdLst>
     <p:sldId id="256" r:id="rId2"/>
     <p:sldId id="257" r:id="rId3"/>
+    <p:sldId id="258" r:id="rId4"/>
+    <p:sldId id="259" r:id="rId5"/>
   </p:sldIdLst>
   <p:sldSz cx="9144000" cy="5143500" type="screen16x9"/>
   <p:notesSz cx="6858000" cy="9144000"/>
@@ -3159,7 +3161,7 @@
             </a:pPr>
             <a:r>
               <a:rPr/>
-              <a:t>A seminar on Data Platforms</a:t>
+              <a:t>Data Platform - Under the hood</a:t>
             </a:r>
           </a:p>
         </p:txBody>
@@ -3209,6 +3211,214 @@
             <a:pPr lvl="0" indent="0" marL="0">
               <a:buNone/>
             </a:pPr>
+          </a:p>
+          <a:p>
+            <a:pPr lvl="0" indent="0" marL="0">
+              <a:spcBef>
+                <a:spcPts val="3000"/>
+              </a:spcBef>
+              <a:buNone/>
+            </a:pPr>
+            <a:r>
+              <a:rPr b="1"/>
+              <a:t>A Cloud Data Platform</a:t>
+            </a:r>
+          </a:p>
+          <a:p>
+            <a:pPr lvl="0"/>
+            <a:r>
+              <a:rPr/>
+              <a:t>Is a </a:t>
+            </a:r>
+            <a:r>
+              <a:rPr i="1"/>
+              <a:t>centralized</a:t>
+            </a:r>
+            <a:r>
+              <a:rPr/>
+              <a:t> infrastructre composed of </a:t>
+            </a:r>
+            <a:r>
+              <a:rPr i="1"/>
+              <a:t>independent</a:t>
+            </a:r>
+            <a:r>
+              <a:rPr/>
+              <a:t> and </a:t>
+            </a:r>
+            <a:r>
+              <a:rPr i="1"/>
+              <a:t>well-integrated</a:t>
+            </a:r>
+            <a:r>
+              <a:rPr/>
+              <a:t> services meeting the </a:t>
+            </a:r>
+            <a:r>
+              <a:rPr i="1"/>
+              <a:t>end-to-end</a:t>
+            </a:r>
+            <a:r>
+              <a:rPr/>
+              <a:t> needs of data pipelines:</a:t>
+            </a:r>
+          </a:p>
+          <a:p>
+            <a:pPr lvl="1"/>
+            <a:r>
+              <a:rPr i="1"/>
+              <a:t>Centralized</a:t>
+            </a:r>
+            <a:r>
+              <a:rPr/>
+              <a:t>: a data platform is conceptually a single and unified component;</a:t>
+            </a:r>
+          </a:p>
+          <a:p>
+            <a:pPr lvl="1"/>
+            <a:r>
+              <a:rPr i="1"/>
+              <a:t>Independent</a:t>
+            </a:r>
+            <a:r>
+              <a:rPr/>
+              <a:t>: changes in a a service do not affect others;</a:t>
+            </a:r>
+          </a:p>
+          <a:p>
+            <a:pPr lvl="1"/>
+            <a:r>
+              <a:rPr i="1"/>
+              <a:t>Well-integrated</a:t>
+            </a:r>
+            <a:r>
+              <a:rPr/>
+              <a:t>: services have interfaces enabling a frictionless composition;</a:t>
+            </a:r>
+          </a:p>
+          <a:p>
+            <a:pPr lvl="1"/>
+            <a:r>
+              <a:rPr i="1"/>
+              <a:t>End-to-end</a:t>
+            </a:r>
+            <a:r>
+              <a:rPr/>
+              <a:t>: services cover the entire data life cycle.</a:t>
+            </a:r>
+          </a:p>
+          <a:p>
+            <a:pPr lvl="0" indent="0" marL="0">
+              <a:buNone/>
+            </a:pPr>
+            <a:r>
+              <a:rPr/>
+              <a:t>Cloud DP are built out of </a:t>
+            </a:r>
+            <a:r>
+              <a:rPr i="1"/>
+              <a:t>service ecosystems</a:t>
+            </a:r>
+            <a:r>
+              <a:rPr/>
+              <a:t> offered by </a:t>
+            </a:r>
+            <a:r>
+              <a:rPr i="1"/>
+              <a:t>Cloud Service Providers</a:t>
+            </a:r>
+            <a:r>
+              <a:rPr/>
+              <a:t> (CSPs).</a:t>
+            </a:r>
+          </a:p>
+        </p:txBody>
+      </p:sp>
+      <p:pic>
+        <p:nvPicPr>
+          <p:cNvPr descr="https://github.com/ManuelePasini/slides-markdown/blob/4893698e949da4ee45c95087b170c011a4b9f687/slides/images/aws_services.png?raw=true" id="0" name="Picture 1"/>
+          <p:cNvPicPr>
+            <a:picLocks noGrp="1" noChangeAspect="1"/>
+          </p:cNvPicPr>
+          <p:nvPr/>
+        </p:nvPicPr>
+        <p:blipFill>
+          <a:blip r:embed="rId2"/>
+          <a:stretch>
+            <a:fillRect/>
+          </a:stretch>
+        </p:blipFill>
+        <p:spPr bwMode="auto">
+          <a:xfrm>
+            <a:off x="1320800" y="1193800"/>
+            <a:ext cx="6515100" cy="2882900"/>
+          </a:xfrm>
+          <a:prstGeom prst="rect">
+            <a:avLst/>
+          </a:prstGeom>
+          <a:noFill/>
+          <a:ln w="9525">
+            <a:noFill/>
+            <a:headEnd/>
+            <a:tailEnd/>
+          </a:ln>
+        </p:spPr>
+      </p:pic>
+      <p:sp>
+        <p:nvSpPr>
+          <p:cNvPr id="1" name="TextBox 3"/>
+          <p:cNvSpPr txBox="1"/>
+          <p:nvPr/>
+        </p:nvSpPr>
+        <p:spPr>
+          <a:xfrm>
+            <a:off x="457200" y="4076700"/>
+            <a:ext cx="8229600" cy="508000"/>
+          </a:xfrm>
+          <a:prstGeom prst="rect">
+            <a:avLst/>
+          </a:prstGeom>
+          <a:noFill/>
+        </p:spPr>
+        <p:txBody>
+          <a:bodyPr/>
+          <a:lstStyle/>
+          <a:p>
+            <a:pPr lvl="0" indent="0" marL="0" algn="ctr">
+              <a:buNone/>
+            </a:pPr>
+            <a:r>
+              <a:rPr/>
+              <a:t>Some of the AWS Services</a:t>
+            </a:r>
+          </a:p>
+        </p:txBody>
+      </p:sp>
+      <p:sp>
+        <p:nvSpPr>
+          <p:cNvPr id="3" name="Content Placeholder 2"/>
+          <p:cNvSpPr>
+            <a:spLocks noGrp="1"/>
+          </p:cNvSpPr>
+          <p:nvPr>
+            <p:ph idx="1"/>
+          </p:nvPr>
+        </p:nvSpPr>
+        <p:spPr/>
+        <p:txBody>
+          <a:bodyPr/>
+          <a:lstStyle/>
+          <a:p>
+            <a:pPr lvl="0" indent="0" marL="0">
+              <a:spcBef>
+                <a:spcPts val="3000"/>
+              </a:spcBef>
+              <a:buNone/>
+            </a:pPr>
+            <a:r>
+              <a:rPr b="1"/>
+              <a:t>On a hardware level</a:t>
+            </a:r>
           </a:p>
         </p:txBody>
       </p:sp>
@@ -3236,12 +3446,122 @@
       </p:grpSpPr>
       <p:sp>
         <p:nvSpPr>
-          <p:cNvPr id="2" name="Title 1"/>
-          <p:cNvSpPr>
-            <a:spLocks noGrp="1"/>
-          </p:cNvSpPr>
-          <p:nvPr>
-            <p:ph type="title"/>
+          <p:cNvPr id="3" name="Content Placeholder 2"/>
+          <p:cNvSpPr>
+            <a:spLocks noGrp="1"/>
+          </p:cNvSpPr>
+          <p:nvPr>
+            <p:ph idx="1" sz="half"/>
+          </p:nvPr>
+        </p:nvSpPr>
+        <p:spPr/>
+        <p:txBody>
+          <a:bodyPr/>
+          <a:lstStyle/>
+          <a:p>
+            <a:pPr lvl="0"/>
+            <a:r>
+              <a:rPr/>
+              <a:t>12 Nodes (to be increased…)</a:t>
+            </a:r>
+          </a:p>
+          <a:p>
+            <a:pPr lvl="1"/>
+            <a:r>
+              <a:rPr/>
+              <a:t>CPU 20 core w5-2445 @4.6 GHZ</a:t>
+            </a:r>
+          </a:p>
+          <a:p>
+            <a:pPr lvl="1"/>
+            <a:r>
+              <a:rPr/>
+              <a:t>256 GB RAM</a:t>
+            </a:r>
+          </a:p>
+          <a:p>
+            <a:pPr lvl="1"/>
+            <a:r>
+              <a:rPr/>
+              <a:t>12 TB HDD</a:t>
+            </a:r>
+          </a:p>
+          <a:p>
+            <a:pPr lvl="0"/>
+            <a:r>
+              <a:rPr/>
+              <a:t>2 GPUs NVIDIA RTX 6000 Ada Generation</a:t>
+            </a:r>
+          </a:p>
+          <a:p>
+            <a:pPr lvl="0"/>
+            <a:r>
+              <a:rPr/>
+              <a:t>1 Network File System (3 TB)</a:t>
+            </a:r>
+          </a:p>
+        </p:txBody>
+      </p:sp>
+      <p:pic>
+        <p:nvPicPr>
+          <p:cNvPr descr="https://github.com/ManuelePasini/slides-markdown/blob/4893698e949da4ee45c95087b170c011a4b9f687/slides/images/dataplat_seminar/Slide5.jpg?raw=true" id="0" name="Picture 1"/>
+          <p:cNvPicPr>
+            <a:picLocks noGrp="1" noChangeAspect="1"/>
+          </p:cNvPicPr>
+          <p:nvPr/>
+        </p:nvPicPr>
+        <p:blipFill>
+          <a:blip r:embed="rId2"/>
+          <a:stretch>
+            <a:fillRect/>
+          </a:stretch>
+        </p:blipFill>
+        <p:spPr bwMode="auto">
+          <a:xfrm>
+            <a:off x="4648200" y="1549400"/>
+            <a:ext cx="4038600" cy="2692400"/>
+          </a:xfrm>
+          <a:prstGeom prst="rect">
+            <a:avLst/>
+          </a:prstGeom>
+          <a:noFill/>
+          <a:ln w="9525">
+            <a:noFill/>
+            <a:headEnd/>
+            <a:tailEnd/>
+          </a:ln>
+        </p:spPr>
+      </p:pic>
+    </p:spTree>
+  </p:cSld>
+</p:sld>
+</file>
+
+<file path=ppt/slides/slide3.xml><?xml version="1.0" encoding="utf-8"?>
+<p:sld xmlns:a="http://schemas.openxmlformats.org/drawingml/2006/main" xmlns:r="http://schemas.openxmlformats.org/officeDocument/2006/relationships" xmlns:p="http://schemas.openxmlformats.org/presentationml/2006/main">
+  <p:cSld>
+    <p:spTree>
+      <p:nvGrpSpPr>
+        <p:cNvPr id="1" name=""/>
+        <p:cNvGrpSpPr/>
+        <p:nvPr/>
+      </p:nvGrpSpPr>
+      <p:grpSpPr>
+        <a:xfrm>
+          <a:off x="0" y="0"/>
+          <a:ext cx="0" cy="0"/>
+          <a:chOff x="0" y="0"/>
+          <a:chExt cx="0" cy="0"/>
+        </a:xfrm>
+      </p:grpSpPr>
+      <p:sp>
+        <p:nvSpPr>
+          <p:cNvPr id="3" name="Content Placeholder 2"/>
+          <p:cNvSpPr>
+            <a:spLocks noGrp="1"/>
+          </p:cNvSpPr>
+          <p:nvPr>
+            <p:ph idx="1"/>
           </p:nvPr>
         </p:nvSpPr>
         <p:spPr/>
@@ -3250,111 +3570,121 @@
           <a:lstStyle/>
           <a:p>
             <a:pPr lvl="0" indent="0" marL="0">
+              <a:spcBef>
+                <a:spcPts val="3000"/>
+              </a:spcBef>
               <a:buNone/>
             </a:pPr>
             <a:r>
+              <a:rPr b="1"/>
+              <a:t>On a hardware level</a:t>
+            </a:r>
+          </a:p>
+        </p:txBody>
+      </p:sp>
+    </p:spTree>
+  </p:cSld>
+</p:sld>
+</file>
+
+<file path=ppt/slides/slide4.xml><?xml version="1.0" encoding="utf-8"?>
+<p:sld xmlns:a="http://schemas.openxmlformats.org/drawingml/2006/main" xmlns:r="http://schemas.openxmlformats.org/officeDocument/2006/relationships" xmlns:p="http://schemas.openxmlformats.org/presentationml/2006/main">
+  <p:cSld>
+    <p:spTree>
+      <p:nvGrpSpPr>
+        <p:cNvPr id="1" name=""/>
+        <p:cNvGrpSpPr/>
+        <p:nvPr/>
+      </p:nvGrpSpPr>
+      <p:grpSpPr>
+        <a:xfrm>
+          <a:off x="0" y="0"/>
+          <a:ext cx="0" cy="0"/>
+          <a:chOff x="0" y="0"/>
+          <a:chExt cx="0" cy="0"/>
+        </a:xfrm>
+      </p:grpSpPr>
+      <p:sp>
+        <p:nvSpPr>
+          <p:cNvPr id="3" name="Content Placeholder 2"/>
+          <p:cNvSpPr>
+            <a:spLocks noGrp="1"/>
+          </p:cNvSpPr>
+          <p:nvPr>
+            <p:ph idx="1" sz="half"/>
+          </p:nvPr>
+        </p:nvSpPr>
+        <p:spPr/>
+        <p:txBody>
+          <a:bodyPr/>
+          <a:lstStyle/>
+          <a:p>
+            <a:pPr lvl="0"/>
+            <a:r>
               <a:rPr/>
-              <a:t>A Cloud Data Platform</a:t>
-            </a:r>
-          </a:p>
-        </p:txBody>
-      </p:sp>
-      <p:sp>
-        <p:nvSpPr>
-          <p:cNvPr id="3" name="Content Placeholder 2"/>
-          <p:cNvSpPr>
-            <a:spLocks noGrp="1"/>
-          </p:cNvSpPr>
-          <p:nvPr>
-            <p:ph idx="1"/>
-          </p:nvPr>
-        </p:nvSpPr>
-        <p:spPr/>
-        <p:txBody>
-          <a:bodyPr/>
-          <a:lstStyle/>
+              <a:t>We don’t really want to work on bare metal…</a:t>
+            </a:r>
+          </a:p>
+          <a:p>
+            <a:pPr lvl="1"/>
+            <a:r>
+              <a:rPr/>
+              <a:t>Need for fault tolerance mechanisms;</a:t>
+            </a:r>
+          </a:p>
+          <a:p>
+            <a:pPr lvl="1"/>
+            <a:r>
+              <a:rPr/>
+              <a:t>Might face dependencies issues;</a:t>
+            </a:r>
+          </a:p>
           <a:p>
             <a:pPr lvl="0"/>
             <a:r>
               <a:rPr/>
-              <a:t>Is a </a:t>
-            </a:r>
-            <a:r>
-              <a:rPr i="1"/>
-              <a:t>centralized</a:t>
-            </a:r>
+              <a:t>… We want to </a:t>
+            </a:r>
+            <a:r>
+              <a:rPr b="1"/>
+              <a:t>virtualize</a:t>
+            </a:r>
+          </a:p>
+          <a:p>
+            <a:pPr lvl="1"/>
             <a:r>
               <a:rPr/>
-              <a:t> infrastructre composed of </a:t>
-            </a:r>
-            <a:r>
-              <a:rPr i="1"/>
-              <a:t>independent</a:t>
+              <a:t>remember the </a:t>
+            </a:r>
+            <a:r>
+              <a:rPr b="1"/>
+              <a:t>independence</a:t>
             </a:r>
             <a:r>
               <a:rPr/>
-              <a:t> and </a:t>
-            </a:r>
-            <a:r>
-              <a:rPr i="1"/>
-              <a:t>well-integrated</a:t>
-            </a:r>
-            <a:r>
-              <a:rPr/>
-              <a:t> services meeting the </a:t>
-            </a:r>
-            <a:r>
-              <a:rPr i="1"/>
-              <a:t>end-to-end</a:t>
-            </a:r>
-            <a:r>
-              <a:rPr/>
-              <a:t> needs of data pipelines:</a:t>
-            </a:r>
-          </a:p>
-          <a:p>
-            <a:pPr lvl="1"/>
-            <a:r>
-              <a:rPr i="1"/>
-              <a:t>Centralized</a:t>
-            </a:r>
-            <a:r>
-              <a:rPr/>
-              <a:t>: a data platform is conceptually a single and unified component;</a:t>
-            </a:r>
-          </a:p>
-          <a:p>
-            <a:pPr lvl="1"/>
-            <a:r>
-              <a:rPr i="1"/>
-              <a:t>Independent</a:t>
-            </a:r>
-            <a:r>
-              <a:rPr/>
-              <a:t>: changes in a a service do not affect others;</a:t>
-            </a:r>
-          </a:p>
-          <a:p>
-            <a:pPr lvl="1"/>
-            <a:r>
-              <a:rPr i="1"/>
-              <a:t>Well-integrated</a:t>
-            </a:r>
-            <a:r>
-              <a:rPr/>
-              <a:t>: services have interfaces enabling a frictionless composition;</a:t>
-            </a:r>
-          </a:p>
-          <a:p>
-            <a:pPr lvl="1"/>
-            <a:r>
-              <a:rPr i="1"/>
-              <a:t>End-to-end</a:t>
-            </a:r>
-            <a:r>
-              <a:rPr/>
-              <a:t>: services cover the entire data life cycle.</a:t>
-            </a:r>
+              <a:t> constraint.</a:t>
+            </a:r>
+          </a:p>
+        </p:txBody>
+      </p:sp>
+      <p:sp>
+        <p:nvSpPr>
+          <p:cNvPr id="4" name="Content Placeholder 3"/>
+          <p:cNvSpPr>
+            <a:spLocks noGrp="1"/>
+          </p:cNvSpPr>
+          <p:nvPr>
+            <p:ph idx="2" sz="half"/>
+          </p:nvPr>
+        </p:nvSpPr>
+        <p:spPr/>
+        <p:txBody>
+          <a:bodyPr/>
+          <a:lstStyle/>
+          <a:p>
+            <a:pPr lvl="0" indent="0" marL="0">
+              <a:buNone/>
+            </a:pPr>
           </a:p>
         </p:txBody>
       </p:sp>

</xml_diff>

<commit_message>
Deploying to gh-pages from @ ManuelePasini/slides-markdown@157418e1d1ca22261406dba86a0f719b9d074234 🚀
</commit_message>
<xml_diff>
--- a/dataplat_seminar.pptx
+++ b/dataplat_seminar.pptx
@@ -9,6 +9,8 @@
     <p:sldId id="257" r:id="rId3"/>
     <p:sldId id="258" r:id="rId4"/>
     <p:sldId id="259" r:id="rId5"/>
+    <p:sldId id="260" r:id="rId6"/>
+    <p:sldId id="261" r:id="rId7"/>
   </p:sldIdLst>
   <p:sldSz cx="9144000" cy="5143500" type="screen16x9"/>
   <p:notesSz cx="6858000" cy="9144000"/>
@@ -3161,7 +3163,7 @@
             </a:pPr>
             <a:r>
               <a:rPr/>
-              <a:t>Data Platform - Under the hood</a:t>
+              <a:t>Data Platforms - Under the hood</a:t>
             </a:r>
           </a:p>
         </p:txBody>
@@ -3504,7 +3506,7 @@
       </p:sp>
       <p:pic>
         <p:nvPicPr>
-          <p:cNvPr descr="https://github.com/ManuelePasini/slides-markdown/blob/4893698e949da4ee45c95087b170c011a4b9f687/slides/images/dataplat_seminar/Slide5.jpg?raw=true" id="0" name="Picture 1"/>
+          <p:cNvPr descr="https://github.com/ManuelePasini/slides-markdown/blob/master/slides/images/dataplat_seminar/Slide5.jpg?raw=true" id="0" name="Picture 1"/>
           <p:cNvPicPr>
             <a:picLocks noGrp="1" noChangeAspect="1"/>
           </p:cNvPicPr>
@@ -3518,8 +3520,8 @@
         </p:blipFill>
         <p:spPr bwMode="auto">
           <a:xfrm>
-            <a:off x="4648200" y="1549400"/>
-            <a:ext cx="4038600" cy="2692400"/>
+            <a:off x="4648200" y="1498600"/>
+            <a:ext cx="4038600" cy="2273300"/>
           </a:xfrm>
           <a:prstGeom prst="rect">
             <a:avLst/>
@@ -3532,6 +3534,36 @@
           </a:ln>
         </p:spPr>
       </p:pic>
+      <p:sp>
+        <p:nvSpPr>
+          <p:cNvPr id="1" name="TextBox 3"/>
+          <p:cNvSpPr txBox="1"/>
+          <p:nvPr/>
+        </p:nvSpPr>
+        <p:spPr>
+          <a:xfrm>
+            <a:off x="4648200" y="4076700"/>
+            <a:ext cx="4038600" cy="508000"/>
+          </a:xfrm>
+          <a:prstGeom prst="rect">
+            <a:avLst/>
+          </a:prstGeom>
+          <a:noFill/>
+        </p:spPr>
+        <p:txBody>
+          <a:bodyPr/>
+          <a:lstStyle/>
+          <a:p>
+            <a:pPr lvl="0" indent="0" marL="0" algn="ctr">
+              <a:buNone/>
+            </a:pPr>
+            <a:r>
+              <a:rPr/>
+              <a:t>Hardware architecture</a:t>
+            </a:r>
+          </a:p>
+        </p:txBody>
+      </p:sp>
     </p:spTree>
   </p:cSld>
 </p:sld>
@@ -3654,15 +3686,18 @@
             <a:pPr lvl="1"/>
             <a:r>
               <a:rPr/>
-              <a:t>remember the </a:t>
-            </a:r>
+              <a:t>remember the independence constraint.</a:t>
+            </a:r>
+          </a:p>
+          <a:p>
+            <a:pPr lvl="0"/>
             <a:r>
               <a:rPr b="1"/>
-              <a:t>independence</a:t>
+              <a:t>Docker Swarm</a:t>
             </a:r>
             <a:r>
               <a:rPr/>
-              <a:t> constraint.</a:t>
+              <a:t> !</a:t>
             </a:r>
           </a:p>
         </p:txBody>
@@ -3685,6 +3720,412 @@
             <a:pPr lvl="0" indent="0" marL="0">
               <a:buNone/>
             </a:pPr>
+            <a:r>
+              <a:rPr/>
+              <a:t>Hardware + Docker architecture</a:t>
+            </a:r>
+          </a:p>
+          <a:p>
+            <a:pPr lvl="0" indent="0" marL="0">
+              <a:buNone/>
+            </a:pPr>
+            <a:r>
+              <a:rPr/>
+              <a:t>Hardware + Docker architecture</a:t>
+            </a:r>
+          </a:p>
+        </p:txBody>
+      </p:sp>
+    </p:spTree>
+  </p:cSld>
+</p:sld>
+</file>
+
+<file path=ppt/slides/slide5.xml><?xml version="1.0" encoding="utf-8"?>
+<p:sld xmlns:a="http://schemas.openxmlformats.org/drawingml/2006/main" xmlns:r="http://schemas.openxmlformats.org/officeDocument/2006/relationships" xmlns:p="http://schemas.openxmlformats.org/presentationml/2006/main">
+  <p:cSld>
+    <p:spTree>
+      <p:nvGrpSpPr>
+        <p:cNvPr id="1" name=""/>
+        <p:cNvGrpSpPr/>
+        <p:nvPr/>
+      </p:nvGrpSpPr>
+      <p:grpSpPr>
+        <a:xfrm>
+          <a:off x="0" y="0"/>
+          <a:ext cx="0" cy="0"/>
+          <a:chOff x="0" y="0"/>
+          <a:chExt cx="0" cy="0"/>
+        </a:xfrm>
+      </p:grpSpPr>
+      <p:sp>
+        <p:nvSpPr>
+          <p:cNvPr id="3" name="Content Placeholder 2"/>
+          <p:cNvSpPr>
+            <a:spLocks noGrp="1"/>
+          </p:cNvSpPr>
+          <p:nvPr>
+            <p:ph idx="1"/>
+          </p:nvPr>
+        </p:nvSpPr>
+        <p:spPr/>
+        <p:txBody>
+          <a:bodyPr/>
+          <a:lstStyle/>
+          <a:p>
+            <a:pPr lvl="0" indent="0" marL="0">
+              <a:spcBef>
+                <a:spcPts val="3000"/>
+              </a:spcBef>
+              <a:buNone/>
+            </a:pPr>
+            <a:r>
+              <a:rPr b="1"/>
+              <a:t>A Docker overview</a:t>
+            </a:r>
+          </a:p>
+          <a:p>
+            <a:pPr lvl="0"/>
+            <a:r>
+              <a:rPr/>
+              <a:t>Differences between containers and virtual machines…</a:t>
+            </a:r>
+          </a:p>
+        </p:txBody>
+      </p:sp>
+    </p:spTree>
+  </p:cSld>
+</p:sld>
+</file>
+
+<file path=ppt/slides/slide6.xml><?xml version="1.0" encoding="utf-8"?>
+<p:sld xmlns:a="http://schemas.openxmlformats.org/drawingml/2006/main" xmlns:r="http://schemas.openxmlformats.org/officeDocument/2006/relationships" xmlns:p="http://schemas.openxmlformats.org/presentationml/2006/main">
+  <p:cSld>
+    <p:spTree>
+      <p:nvGrpSpPr>
+        <p:cNvPr id="1" name=""/>
+        <p:cNvGrpSpPr/>
+        <p:nvPr/>
+      </p:nvGrpSpPr>
+      <p:grpSpPr>
+        <a:xfrm>
+          <a:off x="0" y="0"/>
+          <a:ext cx="0" cy="0"/>
+          <a:chOff x="0" y="0"/>
+          <a:chExt cx="0" cy="0"/>
+        </a:xfrm>
+      </p:grpSpPr>
+      <p:graphicFrame>
+        <p:nvGraphicFramePr>
+          <p:cNvPr id="6" name="Content Placeholder 5"/>
+          <p:cNvGraphicFramePr>
+            <a:graphicFrameLocks noGrp="1"/>
+          </p:cNvGraphicFramePr>
+          <p:nvPr>
+            <p:ph idx="1"/>
+          </p:nvPr>
+        </p:nvGraphicFramePr>
+        <p:xfrm>
+          <a:off x="457200" y="1193800"/>
+          <a:ext cx="4038600" cy="3390900"/>
+        </p:xfrm>
+        <a:graphic>
+          <a:graphicData uri="http://schemas.openxmlformats.org/drawingml/2006/table">
+            <a:tbl>
+              <a:tblPr firstRow="1" bandRow="1">
+                <a:tableStyleId>{5C22544A-7EE6-4342-B048-85BDC9FD1C3A}</a:tableStyleId>
+              </a:tblPr>
+              <a:tblGrid>
+                <a:gridCol w="2019300"/>
+                <a:gridCol w="2019300"/>
+              </a:tblGrid>
+              <a:tr h="0">
+                <a:tc>
+                  <a:txBody>
+                    <a:bodyPr/>
+                    <a:lstStyle/>
+                    <a:p>
+                      <a:pPr lvl="0" indent="0" marL="0">
+                        <a:buNone/>
+                      </a:pPr>
+                      <a:r>
+                        <a:rPr b="1"/>
+                        <a:t>Containers</a:t>
+                      </a:r>
+                    </a:p>
+                  </a:txBody>
+                  <a:tcPr/>
+                </a:tc>
+                <a:tc>
+                  <a:txBody>
+                    <a:bodyPr/>
+                    <a:lstStyle/>
+                    <a:p>
+                      <a:pPr lvl="0" indent="0" marL="0">
+                        <a:buNone/>
+                      </a:pPr>
+                      <a:r>
+                        <a:rPr b="1"/>
+                        <a:t>Virtual Machines</a:t>
+                      </a:r>
+                    </a:p>
+                  </a:txBody>
+                  <a:tcPr/>
+                </a:tc>
+              </a:tr>
+              <a:tr h="0">
+                <a:tc>
+                  <a:txBody>
+                    <a:bodyPr/>
+                    <a:lstStyle/>
+                    <a:p>
+                      <a:pPr lvl="0" indent="0" marL="0">
+                        <a:buNone/>
+                      </a:pPr>
+                      <a:r>
+                        <a:rPr/>
+                        <a:t>Share the host operating system kernel</a:t>
+                      </a:r>
+                    </a:p>
+                  </a:txBody>
+                </a:tc>
+                <a:tc>
+                  <a:txBody>
+                    <a:bodyPr/>
+                    <a:lstStyle/>
+                    <a:p>
+                      <a:pPr lvl="0" indent="0" marL="0">
+                        <a:buNone/>
+                      </a:pPr>
+                      <a:r>
+                        <a:rPr/>
+                        <a:t>Each VM includes a full guest operating system</a:t>
+                      </a:r>
+                    </a:p>
+                  </a:txBody>
+                </a:tc>
+              </a:tr>
+              <a:tr h="0">
+                <a:tc>
+                  <a:txBody>
+                    <a:bodyPr/>
+                    <a:lstStyle/>
+                    <a:p>
+                      <a:pPr lvl="0" indent="0" marL="0">
+                        <a:buNone/>
+                      </a:pPr>
+                      <a:r>
+                        <a:rPr/>
+                        <a:t>Very fast startup</a:t>
+                      </a:r>
+                    </a:p>
+                  </a:txBody>
+                </a:tc>
+                <a:tc>
+                  <a:txBody>
+                    <a:bodyPr/>
+                    <a:lstStyle/>
+                    <a:p>
+                      <a:pPr lvl="0" indent="0" marL="0">
+                        <a:buNone/>
+                      </a:pPr>
+                      <a:r>
+                        <a:rPr/>
+                        <a:t>Slower startup</a:t>
+                      </a:r>
+                    </a:p>
+                  </a:txBody>
+                </a:tc>
+              </a:tr>
+              <a:tr h="0">
+                <a:tc>
+                  <a:txBody>
+                    <a:bodyPr/>
+                    <a:lstStyle/>
+                    <a:p>
+                      <a:pPr lvl="0" indent="0" marL="0">
+                        <a:buNone/>
+                      </a:pPr>
+                      <a:r>
+                        <a:rPr/>
+                        <a:t>Lightweight images</a:t>
+                      </a:r>
+                    </a:p>
+                  </a:txBody>
+                </a:tc>
+                <a:tc>
+                  <a:txBody>
+                    <a:bodyPr/>
+                    <a:lstStyle/>
+                    <a:p>
+                      <a:pPr lvl="0" indent="0" marL="0">
+                        <a:buNone/>
+                      </a:pPr>
+                      <a:r>
+                        <a:rPr/>
+                        <a:t>Heavyweight images</a:t>
+                      </a:r>
+                    </a:p>
+                  </a:txBody>
+                </a:tc>
+              </a:tr>
+              <a:tr h="0">
+                <a:tc>
+                  <a:txBody>
+                    <a:bodyPr/>
+                    <a:lstStyle/>
+                    <a:p>
+                      <a:pPr lvl="0" indent="0" marL="0">
+                        <a:buNone/>
+                      </a:pPr>
+                      <a:r>
+                        <a:rPr/>
+                        <a:t>Logical isolation</a:t>
+                      </a:r>
+                    </a:p>
+                  </a:txBody>
+                </a:tc>
+                <a:tc>
+                  <a:txBody>
+                    <a:bodyPr/>
+                    <a:lstStyle/>
+                    <a:p>
+                      <a:pPr lvl="0" indent="0" marL="0">
+                        <a:buNone/>
+                      </a:pPr>
+                      <a:r>
+                        <a:rPr/>
+                        <a:t>Strong isolation via hypervisor</a:t>
+                      </a:r>
+                    </a:p>
+                  </a:txBody>
+                </a:tc>
+              </a:tr>
+              <a:tr h="0">
+                <a:tc>
+                  <a:txBody>
+                    <a:bodyPr/>
+                    <a:lstStyle/>
+                    <a:p>
+                      <a:pPr lvl="0" indent="0" marL="0">
+                        <a:buNone/>
+                      </a:pPr>
+                      <a:r>
+                        <a:rPr/>
+                        <a:t>Easy and rapid scalability</a:t>
+                      </a:r>
+                    </a:p>
+                  </a:txBody>
+                </a:tc>
+                <a:tc>
+                  <a:txBody>
+                    <a:bodyPr/>
+                    <a:lstStyle/>
+                    <a:p>
+                      <a:pPr lvl="0" indent="0" marL="0">
+                        <a:buNone/>
+                      </a:pPr>
+                      <a:r>
+                        <a:rPr/>
+                        <a:t>More complex to scale</a:t>
+                      </a:r>
+                    </a:p>
+                  </a:txBody>
+                </a:tc>
+              </a:tr>
+              <a:tr h="0">
+                <a:tc>
+                  <a:txBody>
+                    <a:bodyPr/>
+                    <a:lstStyle/>
+                    <a:p>
+                      <a:pPr lvl="0" indent="0" marL="0">
+                        <a:buNone/>
+                      </a:pPr>
+                      <a:r>
+                        <a:rPr/>
+                        <a:t>High workload density</a:t>
+                      </a:r>
+                    </a:p>
+                  </a:txBody>
+                </a:tc>
+                <a:tc>
+                  <a:txBody>
+                    <a:bodyPr/>
+                    <a:lstStyle/>
+                    <a:p>
+                      <a:pPr lvl="0" indent="0" marL="0">
+                        <a:buNone/>
+                      </a:pPr>
+                      <a:r>
+                        <a:rPr/>
+                        <a:t>Lower density due to higher resource consumption</a:t>
+                      </a:r>
+                    </a:p>
+                  </a:txBody>
+                </a:tc>
+              </a:tr>
+            </a:tbl>
+          </a:graphicData>
+        </a:graphic>
+      </p:graphicFrame>
+      <p:pic>
+        <p:nvPicPr>
+          <p:cNvPr descr="https://github.com/ManuelePasini/slides-markdown/blob/master/slides/images/dataplat_seminar/virtualization.jpg?raw=true" id="0" name="Picture 1"/>
+          <p:cNvPicPr>
+            <a:picLocks noGrp="1" noChangeAspect="1"/>
+          </p:cNvPicPr>
+          <p:nvPr/>
+        </p:nvPicPr>
+        <p:blipFill>
+          <a:blip r:embed="rId2"/>
+          <a:stretch>
+            <a:fillRect/>
+          </a:stretch>
+        </p:blipFill>
+        <p:spPr bwMode="auto">
+          <a:xfrm>
+            <a:off x="4648200" y="1612900"/>
+            <a:ext cx="4038600" cy="2044700"/>
+          </a:xfrm>
+          <a:prstGeom prst="rect">
+            <a:avLst/>
+          </a:prstGeom>
+          <a:noFill/>
+          <a:ln w="9525">
+            <a:noFill/>
+            <a:headEnd/>
+            <a:tailEnd/>
+          </a:ln>
+        </p:spPr>
+      </p:pic>
+      <p:sp>
+        <p:nvSpPr>
+          <p:cNvPr id="1" name="TextBox 3"/>
+          <p:cNvSpPr txBox="1"/>
+          <p:nvPr/>
+        </p:nvSpPr>
+        <p:spPr>
+          <a:xfrm>
+            <a:off x="4648200" y="4076700"/>
+            <a:ext cx="4038600" cy="508000"/>
+          </a:xfrm>
+          <a:prstGeom prst="rect">
+            <a:avLst/>
+          </a:prstGeom>
+          <a:noFill/>
+        </p:spPr>
+        <p:txBody>
+          <a:bodyPr/>
+          <a:lstStyle/>
+          <a:p>
+            <a:pPr lvl="0" indent="0" marL="0" algn="ctr">
+              <a:buNone/>
+            </a:pPr>
+            <a:r>
+              <a:rPr/>
+              <a:t>Container vs. Virtual Machines</a:t>
+            </a:r>
           </a:p>
         </p:txBody>
       </p:sp>

</xml_diff>

<commit_message>
Deploying to gh-pages from @ ManuelePasini/slides-markdown@325e96fb138ad5b95be58ca6226e3a980e51725d 🚀
</commit_message>
<xml_diff>
--- a/dataplat_seminar.pptx
+++ b/dataplat_seminar.pptx
@@ -3884,7 +3884,7 @@
                       </a:pPr>
                       <a:r>
                         <a:rPr/>
-                        <a:t>Share the host operating system kernel</a:t>
+                        <a:t>Share host operating system kernel</a:t>
                       </a:r>
                     </a:p>
                   </a:txBody>
@@ -3916,7 +3916,7 @@
                       </a:pPr>
                       <a:r>
                         <a:rPr/>
-                        <a:t>Very fast startup</a:t>
+                        <a:t>Fast startup</a:t>
                       </a:r>
                     </a:p>
                   </a:txBody>
@@ -4012,7 +4012,7 @@
                       </a:pPr>
                       <a:r>
                         <a:rPr/>
-                        <a:t>Easy and rapid scalability</a:t>
+                        <a:t>Easy scalability</a:t>
                       </a:r>
                     </a:p>
                   </a:txBody>

</xml_diff>

<commit_message>
Deploying to gh-pages from @ ManuelePasini/slides-markdown@d4a7495c135a35c07a5399a7797cf675c2746682 🚀
</commit_message>
<xml_diff>
--- a/dataplat_seminar.pptx
+++ b/dataplat_seminar.pptx
@@ -3932,38 +3932,6 @@
                       <a:r>
                         <a:rPr/>
                         <a:t>Slower startup</a:t>
-                      </a:r>
-                    </a:p>
-                  </a:txBody>
-                </a:tc>
-              </a:tr>
-              <a:tr h="0">
-                <a:tc>
-                  <a:txBody>
-                    <a:bodyPr/>
-                    <a:lstStyle/>
-                    <a:p>
-                      <a:pPr lvl="0" indent="0" marL="0">
-                        <a:buNone/>
-                      </a:pPr>
-                      <a:r>
-                        <a:rPr/>
-                        <a:t>Lightweight images</a:t>
-                      </a:r>
-                    </a:p>
-                  </a:txBody>
-                </a:tc>
-                <a:tc>
-                  <a:txBody>
-                    <a:bodyPr/>
-                    <a:lstStyle/>
-                    <a:p>
-                      <a:pPr lvl="0" indent="0" marL="0">
-                        <a:buNone/>
-                      </a:pPr>
-                      <a:r>
-                        <a:rPr/>
-                        <a:t>Heavyweight images</a:t>
                       </a:r>
                     </a:p>
                   </a:txBody>

</xml_diff>

<commit_message>
Deploying to gh-pages from @ ManuelePasini/slides-markdown@e6f04e02ea3be89784dbe5165f119ec9d730cecc 🚀
</commit_message>
<xml_diff>
--- a/dataplat_seminar.pptx
+++ b/dataplat_seminar.pptx
@@ -11,6 +11,8 @@
     <p:sldId id="259" r:id="rId5"/>
     <p:sldId id="260" r:id="rId6"/>
     <p:sldId id="261" r:id="rId7"/>
+    <p:sldId id="262" r:id="rId8"/>
+    <p:sldId id="263" r:id="rId9"/>
   </p:sldIdLst>
   <p:sldSz cx="9144000" cy="5143500" type="screen16x9"/>
   <p:notesSz cx="6858000" cy="9144000"/>
@@ -3311,107 +3313,6 @@
           </a:p>
           <a:p>
             <a:pPr lvl="0" indent="0" marL="0">
-              <a:buNone/>
-            </a:pPr>
-            <a:r>
-              <a:rPr/>
-              <a:t>Cloud DP are built out of </a:t>
-            </a:r>
-            <a:r>
-              <a:rPr i="1"/>
-              <a:t>service ecosystems</a:t>
-            </a:r>
-            <a:r>
-              <a:rPr/>
-              <a:t> offered by </a:t>
-            </a:r>
-            <a:r>
-              <a:rPr i="1"/>
-              <a:t>Cloud Service Providers</a:t>
-            </a:r>
-            <a:r>
-              <a:rPr/>
-              <a:t> (CSPs).</a:t>
-            </a:r>
-          </a:p>
-        </p:txBody>
-      </p:sp>
-      <p:pic>
-        <p:nvPicPr>
-          <p:cNvPr descr="https://github.com/ManuelePasini/slides-markdown/blob/4893698e949da4ee45c95087b170c011a4b9f687/slides/images/aws_services.png?raw=true" id="0" name="Picture 1"/>
-          <p:cNvPicPr>
-            <a:picLocks noGrp="1" noChangeAspect="1"/>
-          </p:cNvPicPr>
-          <p:nvPr/>
-        </p:nvPicPr>
-        <p:blipFill>
-          <a:blip r:embed="rId2"/>
-          <a:stretch>
-            <a:fillRect/>
-          </a:stretch>
-        </p:blipFill>
-        <p:spPr bwMode="auto">
-          <a:xfrm>
-            <a:off x="1320800" y="1193800"/>
-            <a:ext cx="6515100" cy="2882900"/>
-          </a:xfrm>
-          <a:prstGeom prst="rect">
-            <a:avLst/>
-          </a:prstGeom>
-          <a:noFill/>
-          <a:ln w="9525">
-            <a:noFill/>
-            <a:headEnd/>
-            <a:tailEnd/>
-          </a:ln>
-        </p:spPr>
-      </p:pic>
-      <p:sp>
-        <p:nvSpPr>
-          <p:cNvPr id="1" name="TextBox 3"/>
-          <p:cNvSpPr txBox="1"/>
-          <p:nvPr/>
-        </p:nvSpPr>
-        <p:spPr>
-          <a:xfrm>
-            <a:off x="457200" y="4076700"/>
-            <a:ext cx="8229600" cy="508000"/>
-          </a:xfrm>
-          <a:prstGeom prst="rect">
-            <a:avLst/>
-          </a:prstGeom>
-          <a:noFill/>
-        </p:spPr>
-        <p:txBody>
-          <a:bodyPr/>
-          <a:lstStyle/>
-          <a:p>
-            <a:pPr lvl="0" indent="0" marL="0" algn="ctr">
-              <a:buNone/>
-            </a:pPr>
-            <a:r>
-              <a:rPr/>
-              <a:t>Some of the AWS Services</a:t>
-            </a:r>
-          </a:p>
-        </p:txBody>
-      </p:sp>
-      <p:sp>
-        <p:nvSpPr>
-          <p:cNvPr id="3" name="Content Placeholder 2"/>
-          <p:cNvSpPr>
-            <a:spLocks noGrp="1"/>
-          </p:cNvSpPr>
-          <p:nvPr>
-            <p:ph idx="1"/>
-          </p:nvPr>
-        </p:nvSpPr>
-        <p:spPr/>
-        <p:txBody>
-          <a:bodyPr/>
-          <a:lstStyle/>
-          <a:p>
-            <a:pPr lvl="0" indent="0" marL="0">
               <a:spcBef>
                 <a:spcPts val="3000"/>
               </a:spcBef>
@@ -3419,7 +3320,18 @@
             </a:pPr>
             <a:r>
               <a:rPr b="1"/>
-              <a:t>On a hardware level</a:t>
+              <a:t>A case study - The Agritech PNRR Project</a:t>
+            </a:r>
+          </a:p>
+          <a:p>
+            <a:pPr lvl="0"/>
+            <a:r>
+              <a:rPr b="1"/>
+              <a:t>Goal</a:t>
+            </a:r>
+            <a:r>
+              <a:rPr/>
+              <a:t>: Build a data platform to Foster collaboration and integration between different agriculture research projects.</a:t>
             </a:r>
           </a:p>
         </p:txBody>
@@ -3464,7 +3376,176 @@
             <a:pPr lvl="0"/>
             <a:r>
               <a:rPr/>
-              <a:t>12 Nodes (to be increased…)</a:t>
+              <a:t>6 Research partners;</a:t>
+            </a:r>
+          </a:p>
+          <a:p>
+            <a:pPr lvl="0"/>
+            <a:r>
+              <a:rPr/>
+              <a:t>Heterogeneous data;</a:t>
+            </a:r>
+          </a:p>
+          <a:p>
+            <a:pPr lvl="0"/>
+            <a:r>
+              <a:rPr/>
+              <a:t>Governance issues;</a:t>
+            </a:r>
+          </a:p>
+        </p:txBody>
+      </p:sp>
+      <p:pic>
+        <p:nvPicPr>
+          <p:cNvPr descr="https://github.com/ManuelePasini/slides-markdown/blob/master/slides/images/dataplat_seminar/datamesh.jpg?raw=true" id="0" name="Picture 1"/>
+          <p:cNvPicPr>
+            <a:picLocks noGrp="1" noChangeAspect="1"/>
+          </p:cNvPicPr>
+          <p:nvPr/>
+        </p:nvPicPr>
+        <p:blipFill>
+          <a:blip r:embed="rId2"/>
+          <a:stretch>
+            <a:fillRect/>
+          </a:stretch>
+        </p:blipFill>
+        <p:spPr bwMode="auto">
+          <a:xfrm>
+            <a:off x="4648200" y="1498600"/>
+            <a:ext cx="4038600" cy="2273300"/>
+          </a:xfrm>
+          <a:prstGeom prst="rect">
+            <a:avLst/>
+          </a:prstGeom>
+          <a:noFill/>
+          <a:ln w="9525">
+            <a:noFill/>
+            <a:headEnd/>
+            <a:tailEnd/>
+          </a:ln>
+        </p:spPr>
+      </p:pic>
+      <p:sp>
+        <p:nvSpPr>
+          <p:cNvPr id="1" name="TextBox 3"/>
+          <p:cNvSpPr txBox="1"/>
+          <p:nvPr/>
+        </p:nvSpPr>
+        <p:spPr>
+          <a:xfrm>
+            <a:off x="4648200" y="4076700"/>
+            <a:ext cx="4038600" cy="508000"/>
+          </a:xfrm>
+          <a:prstGeom prst="rect">
+            <a:avLst/>
+          </a:prstGeom>
+          <a:noFill/>
+        </p:spPr>
+        <p:txBody>
+          <a:bodyPr/>
+          <a:lstStyle/>
+          <a:p>
+            <a:pPr lvl="0" indent="0" marL="0" algn="ctr">
+              <a:buNone/>
+            </a:pPr>
+            <a:r>
+              <a:rPr/>
+              <a:t>Agritech scenario</a:t>
+            </a:r>
+          </a:p>
+        </p:txBody>
+      </p:sp>
+    </p:spTree>
+  </p:cSld>
+</p:sld>
+</file>
+
+<file path=ppt/slides/slide3.xml><?xml version="1.0" encoding="utf-8"?>
+<p:sld xmlns:a="http://schemas.openxmlformats.org/drawingml/2006/main" xmlns:r="http://schemas.openxmlformats.org/officeDocument/2006/relationships" xmlns:p="http://schemas.openxmlformats.org/presentationml/2006/main">
+  <p:cSld>
+    <p:spTree>
+      <p:nvGrpSpPr>
+        <p:cNvPr id="1" name=""/>
+        <p:cNvGrpSpPr/>
+        <p:nvPr/>
+      </p:nvGrpSpPr>
+      <p:grpSpPr>
+        <a:xfrm>
+          <a:off x="0" y="0"/>
+          <a:ext cx="0" cy="0"/>
+          <a:chOff x="0" y="0"/>
+          <a:chExt cx="0" cy="0"/>
+        </a:xfrm>
+      </p:grpSpPr>
+      <p:sp>
+        <p:nvSpPr>
+          <p:cNvPr id="3" name="Content Placeholder 2"/>
+          <p:cNvSpPr>
+            <a:spLocks noGrp="1"/>
+          </p:cNvSpPr>
+          <p:nvPr>
+            <p:ph idx="1"/>
+          </p:nvPr>
+        </p:nvSpPr>
+        <p:spPr/>
+        <p:txBody>
+          <a:bodyPr/>
+          <a:lstStyle/>
+          <a:p>
+            <a:pPr lvl="0" indent="0" marL="0">
+              <a:spcBef>
+                <a:spcPts val="3000"/>
+              </a:spcBef>
+              <a:buNone/>
+            </a:pPr>
+            <a:r>
+              <a:rPr b="1"/>
+              <a:t>On a hardware level</a:t>
+            </a:r>
+          </a:p>
+        </p:txBody>
+      </p:sp>
+    </p:spTree>
+  </p:cSld>
+</p:sld>
+</file>
+
+<file path=ppt/slides/slide4.xml><?xml version="1.0" encoding="utf-8"?>
+<p:sld xmlns:a="http://schemas.openxmlformats.org/drawingml/2006/main" xmlns:r="http://schemas.openxmlformats.org/officeDocument/2006/relationships" xmlns:p="http://schemas.openxmlformats.org/presentationml/2006/main">
+  <p:cSld>
+    <p:spTree>
+      <p:nvGrpSpPr>
+        <p:cNvPr id="1" name=""/>
+        <p:cNvGrpSpPr/>
+        <p:nvPr/>
+      </p:nvGrpSpPr>
+      <p:grpSpPr>
+        <a:xfrm>
+          <a:off x="0" y="0"/>
+          <a:ext cx="0" cy="0"/>
+          <a:chOff x="0" y="0"/>
+          <a:chExt cx="0" cy="0"/>
+        </a:xfrm>
+      </p:grpSpPr>
+      <p:sp>
+        <p:nvSpPr>
+          <p:cNvPr id="3" name="Content Placeholder 2"/>
+          <p:cNvSpPr>
+            <a:spLocks noGrp="1"/>
+          </p:cNvSpPr>
+          <p:nvPr>
+            <p:ph idx="1" sz="half"/>
+          </p:nvPr>
+        </p:nvSpPr>
+        <p:spPr/>
+        <p:txBody>
+          <a:bodyPr/>
+          <a:lstStyle/>
+          <a:p>
+            <a:pPr lvl="0"/>
+            <a:r>
+              <a:rPr/>
+              <a:t>12 Nodes (and counting…)</a:t>
             </a:r>
           </a:p>
           <a:p>
@@ -3569,178 +3650,6 @@
 </p:sld>
 </file>
 
-<file path=ppt/slides/slide3.xml><?xml version="1.0" encoding="utf-8"?>
-<p:sld xmlns:a="http://schemas.openxmlformats.org/drawingml/2006/main" xmlns:r="http://schemas.openxmlformats.org/officeDocument/2006/relationships" xmlns:p="http://schemas.openxmlformats.org/presentationml/2006/main">
-  <p:cSld>
-    <p:spTree>
-      <p:nvGrpSpPr>
-        <p:cNvPr id="1" name=""/>
-        <p:cNvGrpSpPr/>
-        <p:nvPr/>
-      </p:nvGrpSpPr>
-      <p:grpSpPr>
-        <a:xfrm>
-          <a:off x="0" y="0"/>
-          <a:ext cx="0" cy="0"/>
-          <a:chOff x="0" y="0"/>
-          <a:chExt cx="0" cy="0"/>
-        </a:xfrm>
-      </p:grpSpPr>
-      <p:sp>
-        <p:nvSpPr>
-          <p:cNvPr id="3" name="Content Placeholder 2"/>
-          <p:cNvSpPr>
-            <a:spLocks noGrp="1"/>
-          </p:cNvSpPr>
-          <p:nvPr>
-            <p:ph idx="1"/>
-          </p:nvPr>
-        </p:nvSpPr>
-        <p:spPr/>
-        <p:txBody>
-          <a:bodyPr/>
-          <a:lstStyle/>
-          <a:p>
-            <a:pPr lvl="0" indent="0" marL="0">
-              <a:spcBef>
-                <a:spcPts val="3000"/>
-              </a:spcBef>
-              <a:buNone/>
-            </a:pPr>
-            <a:r>
-              <a:rPr b="1"/>
-              <a:t>On a hardware level</a:t>
-            </a:r>
-          </a:p>
-        </p:txBody>
-      </p:sp>
-    </p:spTree>
-  </p:cSld>
-</p:sld>
-</file>
-
-<file path=ppt/slides/slide4.xml><?xml version="1.0" encoding="utf-8"?>
-<p:sld xmlns:a="http://schemas.openxmlformats.org/drawingml/2006/main" xmlns:r="http://schemas.openxmlformats.org/officeDocument/2006/relationships" xmlns:p="http://schemas.openxmlformats.org/presentationml/2006/main">
-  <p:cSld>
-    <p:spTree>
-      <p:nvGrpSpPr>
-        <p:cNvPr id="1" name=""/>
-        <p:cNvGrpSpPr/>
-        <p:nvPr/>
-      </p:nvGrpSpPr>
-      <p:grpSpPr>
-        <a:xfrm>
-          <a:off x="0" y="0"/>
-          <a:ext cx="0" cy="0"/>
-          <a:chOff x="0" y="0"/>
-          <a:chExt cx="0" cy="0"/>
-        </a:xfrm>
-      </p:grpSpPr>
-      <p:sp>
-        <p:nvSpPr>
-          <p:cNvPr id="3" name="Content Placeholder 2"/>
-          <p:cNvSpPr>
-            <a:spLocks noGrp="1"/>
-          </p:cNvSpPr>
-          <p:nvPr>
-            <p:ph idx="1" sz="half"/>
-          </p:nvPr>
-        </p:nvSpPr>
-        <p:spPr/>
-        <p:txBody>
-          <a:bodyPr/>
-          <a:lstStyle/>
-          <a:p>
-            <a:pPr lvl="0"/>
-            <a:r>
-              <a:rPr/>
-              <a:t>We don’t really want to work on bare metal…</a:t>
-            </a:r>
-          </a:p>
-          <a:p>
-            <a:pPr lvl="1"/>
-            <a:r>
-              <a:rPr/>
-              <a:t>Need for fault tolerance mechanisms;</a:t>
-            </a:r>
-          </a:p>
-          <a:p>
-            <a:pPr lvl="1"/>
-            <a:r>
-              <a:rPr/>
-              <a:t>Might face dependencies issues;</a:t>
-            </a:r>
-          </a:p>
-          <a:p>
-            <a:pPr lvl="0"/>
-            <a:r>
-              <a:rPr/>
-              <a:t>… We want to </a:t>
-            </a:r>
-            <a:r>
-              <a:rPr b="1"/>
-              <a:t>virtualize</a:t>
-            </a:r>
-          </a:p>
-          <a:p>
-            <a:pPr lvl="1"/>
-            <a:r>
-              <a:rPr/>
-              <a:t>remember the independence constraint.</a:t>
-            </a:r>
-          </a:p>
-          <a:p>
-            <a:pPr lvl="0"/>
-            <a:r>
-              <a:rPr b="1"/>
-              <a:t>Docker Swarm</a:t>
-            </a:r>
-            <a:r>
-              <a:rPr/>
-              <a:t> !</a:t>
-            </a:r>
-          </a:p>
-        </p:txBody>
-      </p:sp>
-      <p:sp>
-        <p:nvSpPr>
-          <p:cNvPr id="4" name="Content Placeholder 3"/>
-          <p:cNvSpPr>
-            <a:spLocks noGrp="1"/>
-          </p:cNvSpPr>
-          <p:nvPr>
-            <p:ph idx="2" sz="half"/>
-          </p:nvPr>
-        </p:nvSpPr>
-        <p:spPr/>
-        <p:txBody>
-          <a:bodyPr/>
-          <a:lstStyle/>
-          <a:p>
-            <a:pPr lvl="0" indent="0" marL="0">
-              <a:buNone/>
-            </a:pPr>
-            <a:r>
-              <a:rPr/>
-              <a:t>Hardware + Docker architecture</a:t>
-            </a:r>
-          </a:p>
-          <a:p>
-            <a:pPr lvl="0" indent="0" marL="0">
-              <a:buNone/>
-            </a:pPr>
-            <a:r>
-              <a:rPr/>
-              <a:t>Hardware + Docker architecture</a:t>
-            </a:r>
-          </a:p>
-        </p:txBody>
-      </p:sp>
-    </p:spTree>
-  </p:cSld>
-</p:sld>
-</file>
-
 <file path=ppt/slides/slide5.xml><?xml version="1.0" encoding="utf-8"?>
 <p:sld xmlns:a="http://schemas.openxmlformats.org/drawingml/2006/main" xmlns:r="http://schemas.openxmlformats.org/officeDocument/2006/relationships" xmlns:p="http://schemas.openxmlformats.org/presentationml/2006/main">
   <p:cSld>
@@ -3781,14 +3690,7 @@
             </a:pPr>
             <a:r>
               <a:rPr b="1"/>
-              <a:t>A Docker overview</a:t>
-            </a:r>
-          </a:p>
-          <a:p>
-            <a:pPr lvl="0"/>
-            <a:r>
-              <a:rPr/>
-              <a:t>Differences between containers and virtual machines…</a:t>
+              <a:t>On a hardware level</a:t>
             </a:r>
           </a:p>
         </p:txBody>
@@ -3799,6 +3701,185 @@
 </file>
 
 <file path=ppt/slides/slide6.xml><?xml version="1.0" encoding="utf-8"?>
+<p:sld xmlns:a="http://schemas.openxmlformats.org/drawingml/2006/main" xmlns:r="http://schemas.openxmlformats.org/officeDocument/2006/relationships" xmlns:p="http://schemas.openxmlformats.org/presentationml/2006/main">
+  <p:cSld>
+    <p:spTree>
+      <p:nvGrpSpPr>
+        <p:cNvPr id="1" name=""/>
+        <p:cNvGrpSpPr/>
+        <p:nvPr/>
+      </p:nvGrpSpPr>
+      <p:grpSpPr>
+        <a:xfrm>
+          <a:off x="0" y="0"/>
+          <a:ext cx="0" cy="0"/>
+          <a:chOff x="0" y="0"/>
+          <a:chExt cx="0" cy="0"/>
+        </a:xfrm>
+      </p:grpSpPr>
+      <p:sp>
+        <p:nvSpPr>
+          <p:cNvPr id="3" name="Content Placeholder 2"/>
+          <p:cNvSpPr>
+            <a:spLocks noGrp="1"/>
+          </p:cNvSpPr>
+          <p:nvPr>
+            <p:ph idx="1" sz="half"/>
+          </p:nvPr>
+        </p:nvSpPr>
+        <p:spPr/>
+        <p:txBody>
+          <a:bodyPr/>
+          <a:lstStyle/>
+          <a:p>
+            <a:pPr lvl="0"/>
+            <a:r>
+              <a:rPr/>
+              <a:t>We don’t really want to work on bare metal…</a:t>
+            </a:r>
+          </a:p>
+          <a:p>
+            <a:pPr lvl="1"/>
+            <a:r>
+              <a:rPr/>
+              <a:t>Need for fault tolerance mechanisms;</a:t>
+            </a:r>
+          </a:p>
+          <a:p>
+            <a:pPr lvl="1"/>
+            <a:r>
+              <a:rPr/>
+              <a:t>Might face dependencies issues;</a:t>
+            </a:r>
+          </a:p>
+          <a:p>
+            <a:pPr lvl="0"/>
+            <a:r>
+              <a:rPr/>
+              <a:t>… We want to </a:t>
+            </a:r>
+            <a:r>
+              <a:rPr b="1"/>
+              <a:t>virtualize</a:t>
+            </a:r>
+          </a:p>
+          <a:p>
+            <a:pPr lvl="1"/>
+            <a:r>
+              <a:rPr/>
+              <a:t>remember the independence constraint.</a:t>
+            </a:r>
+          </a:p>
+          <a:p>
+            <a:pPr lvl="0"/>
+            <a:r>
+              <a:rPr b="1"/>
+              <a:t>Docker Swarm</a:t>
+            </a:r>
+            <a:r>
+              <a:rPr/>
+              <a:t> !</a:t>
+            </a:r>
+          </a:p>
+        </p:txBody>
+      </p:sp>
+      <p:sp>
+        <p:nvSpPr>
+          <p:cNvPr id="4" name="Content Placeholder 3"/>
+          <p:cNvSpPr>
+            <a:spLocks noGrp="1"/>
+          </p:cNvSpPr>
+          <p:nvPr>
+            <p:ph idx="2" sz="half"/>
+          </p:nvPr>
+        </p:nvSpPr>
+        <p:spPr/>
+        <p:txBody>
+          <a:bodyPr/>
+          <a:lstStyle/>
+          <a:p>
+            <a:pPr lvl="0" indent="0" marL="0">
+              <a:buNone/>
+            </a:pPr>
+            <a:r>
+              <a:rPr/>
+              <a:t>Hardware + Docker architecture</a:t>
+            </a:r>
+          </a:p>
+          <a:p>
+            <a:pPr lvl="0" indent="0" marL="0">
+              <a:buNone/>
+            </a:pPr>
+            <a:r>
+              <a:rPr/>
+              <a:t>Hardware + Docker architecture</a:t>
+            </a:r>
+          </a:p>
+        </p:txBody>
+      </p:sp>
+    </p:spTree>
+  </p:cSld>
+</p:sld>
+</file>
+
+<file path=ppt/slides/slide7.xml><?xml version="1.0" encoding="utf-8"?>
+<p:sld xmlns:a="http://schemas.openxmlformats.org/drawingml/2006/main" xmlns:r="http://schemas.openxmlformats.org/officeDocument/2006/relationships" xmlns:p="http://schemas.openxmlformats.org/presentationml/2006/main">
+  <p:cSld>
+    <p:spTree>
+      <p:nvGrpSpPr>
+        <p:cNvPr id="1" name=""/>
+        <p:cNvGrpSpPr/>
+        <p:nvPr/>
+      </p:nvGrpSpPr>
+      <p:grpSpPr>
+        <a:xfrm>
+          <a:off x="0" y="0"/>
+          <a:ext cx="0" cy="0"/>
+          <a:chOff x="0" y="0"/>
+          <a:chExt cx="0" cy="0"/>
+        </a:xfrm>
+      </p:grpSpPr>
+      <p:sp>
+        <p:nvSpPr>
+          <p:cNvPr id="3" name="Content Placeholder 2"/>
+          <p:cNvSpPr>
+            <a:spLocks noGrp="1"/>
+          </p:cNvSpPr>
+          <p:nvPr>
+            <p:ph idx="1"/>
+          </p:nvPr>
+        </p:nvSpPr>
+        <p:spPr/>
+        <p:txBody>
+          <a:bodyPr/>
+          <a:lstStyle/>
+          <a:p>
+            <a:pPr lvl="0" indent="0" marL="0">
+              <a:spcBef>
+                <a:spcPts val="3000"/>
+              </a:spcBef>
+              <a:buNone/>
+            </a:pPr>
+            <a:r>
+              <a:rPr b="1"/>
+              <a:t>A Docker overview</a:t>
+            </a:r>
+          </a:p>
+          <a:p>
+            <a:pPr lvl="0"/>
+            <a:r>
+              <a:rPr/>
+              <a:t>Differences between containers and virtual machines…</a:t>
+            </a:r>
+          </a:p>
+        </p:txBody>
+      </p:sp>
+    </p:spTree>
+  </p:cSld>
+</p:sld>
+</file>
+
+<file path=ppt/slides/slide8.xml><?xml version="1.0" encoding="utf-8"?>
 <p:sld xmlns:a="http://schemas.openxmlformats.org/drawingml/2006/main" xmlns:r="http://schemas.openxmlformats.org/officeDocument/2006/relationships" xmlns:p="http://schemas.openxmlformats.org/presentationml/2006/main">
   <p:cSld>
     <p:spTree>

</xml_diff>

<commit_message>
Deploying to gh-pages from @ ManuelePasini/slides-markdown@fbd264b5fa61edf1769fa3df697c0cf5ae11a6d3 🚀
</commit_message>
<xml_diff>
--- a/dataplat_seminar.pptx
+++ b/dataplat_seminar.pptx
@@ -3376,21 +3376,49 @@
             <a:pPr lvl="0"/>
             <a:r>
               <a:rPr/>
-              <a:t>6 Research partners;</a:t>
+              <a:t>In short:</a:t>
+            </a:r>
+          </a:p>
+          <a:p>
+            <a:pPr lvl="1"/>
+            <a:r>
+              <a:rPr/>
+              <a:t>6 research partners;</a:t>
+            </a:r>
+          </a:p>
+          <a:p>
+            <a:pPr lvl="1"/>
+            <a:r>
+              <a:rPr/>
+              <a:t>highly heterogeneous data;</a:t>
+            </a:r>
+          </a:p>
+          <a:p>
+            <a:pPr lvl="1"/>
+            <a:r>
+              <a:rPr/>
+              <a:t>different goals;</a:t>
             </a:r>
           </a:p>
           <a:p>
             <a:pPr lvl="0"/>
             <a:r>
               <a:rPr/>
-              <a:t>Heterogeneous data;</a:t>
-            </a:r>
-          </a:p>
-          <a:p>
-            <a:pPr lvl="0"/>
+              <a:t>Main challenges:</a:t>
+            </a:r>
+          </a:p>
+          <a:p>
+            <a:pPr lvl="1"/>
             <a:r>
               <a:rPr/>
               <a:t>Governance issues;</a:t>
+            </a:r>
+          </a:p>
+          <a:p>
+            <a:pPr lvl="1"/>
+            <a:r>
+              <a:rPr/>
+              <a:t>Integration issues.</a:t>
             </a:r>
           </a:p>
         </p:txBody>
@@ -3450,7 +3478,7 @@
             </a:pPr>
             <a:r>
               <a:rPr/>
-              <a:t>Agritech scenario</a:t>
+              <a:t>Agritech project</a:t>
             </a:r>
           </a:p>
         </p:txBody>

</xml_diff>

<commit_message>
Deploying to gh-pages from @ ManuelePasini/slides-markdown@5f2facc293e106ca2346bac4dd88412594a11113 🚀
</commit_message>
<xml_diff>
--- a/dataplat_seminar.pptx
+++ b/dataplat_seminar.pptx
@@ -3507,6 +3507,31 @@
       </p:grpSpPr>
       <p:sp>
         <p:nvSpPr>
+          <p:cNvPr id="2" name="Title 1"/>
+          <p:cNvSpPr>
+            <a:spLocks noGrp="1"/>
+          </p:cNvSpPr>
+          <p:nvPr>
+            <p:ph type="title"/>
+          </p:nvPr>
+        </p:nvSpPr>
+        <p:spPr/>
+        <p:txBody>
+          <a:bodyPr/>
+          <a:lstStyle/>
+          <a:p>
+            <a:pPr lvl="0" indent="0" marL="0">
+              <a:buNone/>
+            </a:pPr>
+            <a:r>
+              <a:rPr/>
+              <a:t>Let’s talk deploy!</a:t>
+            </a:r>
+          </a:p>
+        </p:txBody>
+      </p:sp>
+      <p:sp>
+        <p:nvSpPr>
           <p:cNvPr id="3" name="Content Placeholder 2"/>
           <p:cNvSpPr>
             <a:spLocks noGrp="1"/>
@@ -3897,7 +3922,7 @@
             <a:pPr lvl="0"/>
             <a:r>
               <a:rPr/>
-              <a:t>Differences between containers and virtual machines…</a:t>
+              <a:t>Docker is a platform for developing, shipping and running application using container based virtualization technology.</a:t>
             </a:r>
           </a:p>
         </p:txBody>
@@ -3924,228 +3949,64 @@
           <a:chExt cx="0" cy="0"/>
         </a:xfrm>
       </p:grpSpPr>
-      <p:graphicFrame>
-        <p:nvGraphicFramePr>
-          <p:cNvPr id="6" name="Content Placeholder 5"/>
-          <p:cNvGraphicFramePr>
-            <a:graphicFrameLocks noGrp="1"/>
-          </p:cNvGraphicFramePr>
-          <p:nvPr>
-            <p:ph idx="1"/>
-          </p:nvPr>
-        </p:nvGraphicFramePr>
-        <p:xfrm>
-          <a:off x="457200" y="1193800"/>
-          <a:ext cx="4038600" cy="3390900"/>
-        </p:xfrm>
-        <a:graphic>
-          <a:graphicData uri="http://schemas.openxmlformats.org/drawingml/2006/table">
-            <a:tbl>
-              <a:tblPr firstRow="1" bandRow="1">
-                <a:tableStyleId>{5C22544A-7EE6-4342-B048-85BDC9FD1C3A}</a:tableStyleId>
-              </a:tblPr>
-              <a:tblGrid>
-                <a:gridCol w="2019300"/>
-                <a:gridCol w="2019300"/>
-              </a:tblGrid>
-              <a:tr h="0">
-                <a:tc>
-                  <a:txBody>
-                    <a:bodyPr/>
-                    <a:lstStyle/>
-                    <a:p>
-                      <a:pPr lvl="0" indent="0" marL="0">
-                        <a:buNone/>
-                      </a:pPr>
-                      <a:r>
-                        <a:rPr b="1"/>
-                        <a:t>Containers</a:t>
-                      </a:r>
-                    </a:p>
-                  </a:txBody>
-                  <a:tcPr/>
-                </a:tc>
-                <a:tc>
-                  <a:txBody>
-                    <a:bodyPr/>
-                    <a:lstStyle/>
-                    <a:p>
-                      <a:pPr lvl="0" indent="0" marL="0">
-                        <a:buNone/>
-                      </a:pPr>
-                      <a:r>
-                        <a:rPr b="1"/>
-                        <a:t>Virtual Machines</a:t>
-                      </a:r>
-                    </a:p>
-                  </a:txBody>
-                  <a:tcPr/>
-                </a:tc>
-              </a:tr>
-              <a:tr h="0">
-                <a:tc>
-                  <a:txBody>
-                    <a:bodyPr/>
-                    <a:lstStyle/>
-                    <a:p>
-                      <a:pPr lvl="0" indent="0" marL="0">
-                        <a:buNone/>
-                      </a:pPr>
-                      <a:r>
-                        <a:rPr/>
-                        <a:t>Share host operating system kernel</a:t>
-                      </a:r>
-                    </a:p>
-                  </a:txBody>
-                </a:tc>
-                <a:tc>
-                  <a:txBody>
-                    <a:bodyPr/>
-                    <a:lstStyle/>
-                    <a:p>
-                      <a:pPr lvl="0" indent="0" marL="0">
-                        <a:buNone/>
-                      </a:pPr>
-                      <a:r>
-                        <a:rPr/>
-                        <a:t>Each VM includes a full guest operating system</a:t>
-                      </a:r>
-                    </a:p>
-                  </a:txBody>
-                </a:tc>
-              </a:tr>
-              <a:tr h="0">
-                <a:tc>
-                  <a:txBody>
-                    <a:bodyPr/>
-                    <a:lstStyle/>
-                    <a:p>
-                      <a:pPr lvl="0" indent="0" marL="0">
-                        <a:buNone/>
-                      </a:pPr>
-                      <a:r>
-                        <a:rPr/>
-                        <a:t>Fast startup</a:t>
-                      </a:r>
-                    </a:p>
-                  </a:txBody>
-                </a:tc>
-                <a:tc>
-                  <a:txBody>
-                    <a:bodyPr/>
-                    <a:lstStyle/>
-                    <a:p>
-                      <a:pPr lvl="0" indent="0" marL="0">
-                        <a:buNone/>
-                      </a:pPr>
-                      <a:r>
-                        <a:rPr/>
-                        <a:t>Slower startup</a:t>
-                      </a:r>
-                    </a:p>
-                  </a:txBody>
-                </a:tc>
-              </a:tr>
-              <a:tr h="0">
-                <a:tc>
-                  <a:txBody>
-                    <a:bodyPr/>
-                    <a:lstStyle/>
-                    <a:p>
-                      <a:pPr lvl="0" indent="0" marL="0">
-                        <a:buNone/>
-                      </a:pPr>
-                      <a:r>
-                        <a:rPr/>
-                        <a:t>Logical isolation</a:t>
-                      </a:r>
-                    </a:p>
-                  </a:txBody>
-                </a:tc>
-                <a:tc>
-                  <a:txBody>
-                    <a:bodyPr/>
-                    <a:lstStyle/>
-                    <a:p>
-                      <a:pPr lvl="0" indent="0" marL="0">
-                        <a:buNone/>
-                      </a:pPr>
-                      <a:r>
-                        <a:rPr/>
-                        <a:t>Strong isolation via hypervisor</a:t>
-                      </a:r>
-                    </a:p>
-                  </a:txBody>
-                </a:tc>
-              </a:tr>
-              <a:tr h="0">
-                <a:tc>
-                  <a:txBody>
-                    <a:bodyPr/>
-                    <a:lstStyle/>
-                    <a:p>
-                      <a:pPr lvl="0" indent="0" marL="0">
-                        <a:buNone/>
-                      </a:pPr>
-                      <a:r>
-                        <a:rPr/>
-                        <a:t>Easy scalability</a:t>
-                      </a:r>
-                    </a:p>
-                  </a:txBody>
-                </a:tc>
-                <a:tc>
-                  <a:txBody>
-                    <a:bodyPr/>
-                    <a:lstStyle/>
-                    <a:p>
-                      <a:pPr lvl="0" indent="0" marL="0">
-                        <a:buNone/>
-                      </a:pPr>
-                      <a:r>
-                        <a:rPr/>
-                        <a:t>More complex to scale</a:t>
-                      </a:r>
-                    </a:p>
-                  </a:txBody>
-                </a:tc>
-              </a:tr>
-              <a:tr h="0">
-                <a:tc>
-                  <a:txBody>
-                    <a:bodyPr/>
-                    <a:lstStyle/>
-                    <a:p>
-                      <a:pPr lvl="0" indent="0" marL="0">
-                        <a:buNone/>
-                      </a:pPr>
-                      <a:r>
-                        <a:rPr/>
-                        <a:t>High workload density</a:t>
-                      </a:r>
-                    </a:p>
-                  </a:txBody>
-                </a:tc>
-                <a:tc>
-                  <a:txBody>
-                    <a:bodyPr/>
-                    <a:lstStyle/>
-                    <a:p>
-                      <a:pPr lvl="0" indent="0" marL="0">
-                        <a:buNone/>
-                      </a:pPr>
-                      <a:r>
-                        <a:rPr/>
-                        <a:t>Lower density due to higher resource consumption</a:t>
-                      </a:r>
-                    </a:p>
-                  </a:txBody>
-                </a:tc>
-              </a:tr>
-            </a:tbl>
-          </a:graphicData>
-        </a:graphic>
-      </p:graphicFrame>
+      <p:sp>
+        <p:nvSpPr>
+          <p:cNvPr id="3" name="Content Placeholder 2"/>
+          <p:cNvSpPr>
+            <a:spLocks noGrp="1"/>
+          </p:cNvSpPr>
+          <p:nvPr>
+            <p:ph idx="1" sz="half"/>
+          </p:nvPr>
+        </p:nvSpPr>
+        <p:spPr/>
+        <p:txBody>
+          <a:bodyPr/>
+          <a:lstStyle/>
+          <a:p>
+            <a:pPr lvl="0"/>
+            <a:r>
+              <a:rPr/>
+              <a:t>w.r.t. virtual machines (e.g., VMWare):</a:t>
+            </a:r>
+          </a:p>
+          <a:p>
+            <a:pPr lvl="1"/>
+            <a:r>
+              <a:rPr/>
+              <a:t>more lightweight;</a:t>
+            </a:r>
+          </a:p>
+          <a:p>
+            <a:pPr lvl="1"/>
+            <a:r>
+              <a:rPr/>
+              <a:t>no guest OS;</a:t>
+            </a:r>
+          </a:p>
+          <a:p>
+            <a:pPr lvl="1"/>
+            <a:r>
+              <a:rPr/>
+              <a:t>reduced resource consumption;</a:t>
+            </a:r>
+          </a:p>
+          <a:p>
+            <a:pPr lvl="1"/>
+            <a:r>
+              <a:rPr/>
+              <a:t>more containers per host;</a:t>
+            </a:r>
+          </a:p>
+          <a:p>
+            <a:pPr lvl="1"/>
+            <a:r>
+              <a:rPr/>
+              <a:t>greater portability</a:t>
+            </a:r>
+          </a:p>
+        </p:txBody>
+      </p:sp>
       <p:pic>
         <p:nvPicPr>
           <p:cNvPr descr="https://github.com/ManuelePasini/slides-markdown/blob/master/slides/images/dataplat_seminar/virtualization.jpg?raw=true" id="0" name="Picture 1"/>

</xml_diff>

<commit_message>
Deploying to gh-pages from @ ManuelePasini/slides-markdown@927a6ef3eb0f6ff9187cd85d5a56846f83e8f543 🚀
</commit_message>
<xml_diff>
--- a/dataplat_seminar.pptx
+++ b/dataplat_seminar.pptx
@@ -13,6 +13,13 @@
     <p:sldId id="261" r:id="rId7"/>
     <p:sldId id="262" r:id="rId8"/>
     <p:sldId id="263" r:id="rId9"/>
+    <p:sldId id="264" r:id="rId10"/>
+    <p:sldId id="265" r:id="rId11"/>
+    <p:sldId id="266" r:id="rId12"/>
+    <p:sldId id="267" r:id="rId13"/>
+    <p:sldId id="268" r:id="rId14"/>
+    <p:sldId id="269" r:id="rId15"/>
+    <p:sldId id="270" r:id="rId16"/>
   </p:sldIdLst>
   <p:sldSz cx="9144000" cy="5143500" type="screen16x9"/>
   <p:notesSz cx="6858000" cy="9144000"/>
@@ -3341,6 +3348,486 @@
 </p:sld>
 </file>
 
+<file path=ppt/slides/slide10.xml><?xml version="1.0" encoding="utf-8"?>
+<p:sld xmlns:a="http://schemas.openxmlformats.org/drawingml/2006/main" xmlns:r="http://schemas.openxmlformats.org/officeDocument/2006/relationships" xmlns:p="http://schemas.openxmlformats.org/presentationml/2006/main">
+  <p:cSld>
+    <p:spTree>
+      <p:nvGrpSpPr>
+        <p:cNvPr id="1" name=""/>
+        <p:cNvGrpSpPr/>
+        <p:nvPr/>
+      </p:nvGrpSpPr>
+      <p:grpSpPr>
+        <a:xfrm>
+          <a:off x="0" y="0"/>
+          <a:ext cx="0" cy="0"/>
+          <a:chOff x="0" y="0"/>
+          <a:chExt cx="0" cy="0"/>
+        </a:xfrm>
+      </p:grpSpPr>
+      <p:sp>
+        <p:nvSpPr>
+          <p:cNvPr id="4" name="Text Placeholder 3"/>
+          <p:cNvSpPr>
+            <a:spLocks noGrp="1"/>
+          </p:cNvSpPr>
+          <p:nvPr>
+            <p:ph idx="2" sz="half" type="body"/>
+          </p:nvPr>
+        </p:nvSpPr>
+        <p:spPr/>
+        <p:txBody>
+          <a:bodyPr/>
+          <a:lstStyle/>
+          <a:p>
+            <a:pPr lvl="0" indent="0" marL="0">
+              <a:spcBef>
+                <a:spcPts val="3000"/>
+              </a:spcBef>
+              <a:buNone/>
+            </a:pPr>
+            <a:r>
+              <a:rPr b="1"/>
+              <a:t>test2</a:t>
+            </a:r>
+          </a:p>
+        </p:txBody>
+      </p:sp>
+      <p:pic>
+        <p:nvPicPr>
+          <p:cNvPr descr="https://github.com/ManuelePasini/slides-markdown/blob/master/slides/images/dataplat_seminar/ortho.jpg?raw=true" id="0" name="Picture 1"/>
+          <p:cNvPicPr>
+            <a:picLocks noGrp="1" noChangeAspect="1"/>
+          </p:cNvPicPr>
+          <p:nvPr/>
+        </p:nvPicPr>
+        <p:blipFill>
+          <a:blip r:embed="rId2"/>
+          <a:stretch>
+            <a:fillRect/>
+          </a:stretch>
+        </p:blipFill>
+        <p:spPr bwMode="auto">
+          <a:xfrm>
+            <a:off x="3568700" y="685800"/>
+            <a:ext cx="5105400" cy="3403600"/>
+          </a:xfrm>
+          <a:prstGeom prst="rect">
+            <a:avLst/>
+          </a:prstGeom>
+          <a:noFill/>
+          <a:ln w="9525">
+            <a:noFill/>
+            <a:headEnd/>
+            <a:tailEnd/>
+          </a:ln>
+        </p:spPr>
+      </p:pic>
+    </p:spTree>
+  </p:cSld>
+</p:sld>
+</file>
+
+<file path=ppt/slides/slide11.xml><?xml version="1.0" encoding="utf-8"?>
+<p:sld xmlns:a="http://schemas.openxmlformats.org/drawingml/2006/main" xmlns:r="http://schemas.openxmlformats.org/officeDocument/2006/relationships" xmlns:p="http://schemas.openxmlformats.org/presentationml/2006/main">
+  <p:cSld>
+    <p:spTree>
+      <p:nvGrpSpPr>
+        <p:cNvPr id="1" name=""/>
+        <p:cNvGrpSpPr/>
+        <p:nvPr/>
+      </p:nvGrpSpPr>
+      <p:grpSpPr>
+        <a:xfrm>
+          <a:off x="0" y="0"/>
+          <a:ext cx="0" cy="0"/>
+          <a:chOff x="0" y="0"/>
+          <a:chExt cx="0" cy="0"/>
+        </a:xfrm>
+      </p:grpSpPr>
+      <p:sp>
+        <p:nvSpPr>
+          <p:cNvPr id="4" name="Text Placeholder 3"/>
+          <p:cNvSpPr>
+            <a:spLocks noGrp="1"/>
+          </p:cNvSpPr>
+          <p:nvPr>
+            <p:ph idx="2" sz="half" type="body"/>
+          </p:nvPr>
+        </p:nvSpPr>
+        <p:spPr/>
+        <p:txBody>
+          <a:bodyPr/>
+          <a:lstStyle/>
+          <a:p>
+            <a:pPr lvl="0" indent="0" marL="0">
+              <a:spcBef>
+                <a:spcPts val="3000"/>
+              </a:spcBef>
+              <a:buNone/>
+            </a:pPr>
+            <a:r>
+              <a:rPr b="1"/>
+              <a:t>test3</a:t>
+            </a:r>
+          </a:p>
+        </p:txBody>
+      </p:sp>
+      <p:pic>
+        <p:nvPicPr>
+          <p:cNvPr descr="https://github.com/ManuelePasini/slides-markdown/blob/master/slides/images/dataplat_seminar/watering_pipeline.jpg?raw=true" id="0" name="Picture 1"/>
+          <p:cNvPicPr>
+            <a:picLocks noGrp="1" noChangeAspect="1"/>
+          </p:cNvPicPr>
+          <p:nvPr/>
+        </p:nvPicPr>
+        <p:blipFill>
+          <a:blip r:embed="rId2"/>
+          <a:stretch>
+            <a:fillRect/>
+          </a:stretch>
+        </p:blipFill>
+        <p:spPr bwMode="auto">
+          <a:xfrm>
+            <a:off x="3568700" y="952500"/>
+            <a:ext cx="5105400" cy="2870200"/>
+          </a:xfrm>
+          <a:prstGeom prst="rect">
+            <a:avLst/>
+          </a:prstGeom>
+          <a:noFill/>
+          <a:ln w="9525">
+            <a:noFill/>
+            <a:headEnd/>
+            <a:tailEnd/>
+          </a:ln>
+        </p:spPr>
+      </p:pic>
+    </p:spTree>
+  </p:cSld>
+</p:sld>
+</file>
+
+<file path=ppt/slides/slide12.xml><?xml version="1.0" encoding="utf-8"?>
+<p:sld xmlns:a="http://schemas.openxmlformats.org/drawingml/2006/main" xmlns:r="http://schemas.openxmlformats.org/officeDocument/2006/relationships" xmlns:p="http://schemas.openxmlformats.org/presentationml/2006/main">
+  <p:cSld>
+    <p:spTree>
+      <p:nvGrpSpPr>
+        <p:cNvPr id="1" name=""/>
+        <p:cNvGrpSpPr/>
+        <p:nvPr/>
+      </p:nvGrpSpPr>
+      <p:grpSpPr>
+        <a:xfrm>
+          <a:off x="0" y="0"/>
+          <a:ext cx="0" cy="0"/>
+          <a:chOff x="0" y="0"/>
+          <a:chExt cx="0" cy="0"/>
+        </a:xfrm>
+      </p:grpSpPr>
+      <p:sp>
+        <p:nvSpPr>
+          <p:cNvPr id="4" name="Text Placeholder 3"/>
+          <p:cNvSpPr>
+            <a:spLocks noGrp="1"/>
+          </p:cNvSpPr>
+          <p:nvPr>
+            <p:ph idx="2" sz="half" type="body"/>
+          </p:nvPr>
+        </p:nvSpPr>
+        <p:spPr/>
+        <p:txBody>
+          <a:bodyPr/>
+          <a:lstStyle/>
+          <a:p>
+            <a:pPr lvl="0" indent="0" marL="0">
+              <a:spcBef>
+                <a:spcPts val="3000"/>
+              </a:spcBef>
+              <a:buNone/>
+            </a:pPr>
+            <a:r>
+              <a:rPr b="1"/>
+              <a:t>test4</a:t>
+            </a:r>
+          </a:p>
+        </p:txBody>
+      </p:sp>
+      <p:pic>
+        <p:nvPicPr>
+          <p:cNvPr descr="https://github.com/ManuelePasini/slides-markdown/blob/master/slides/images/dataplat_seminar/agritech.jpg?raw=true" id="0" name="Picture 1"/>
+          <p:cNvPicPr>
+            <a:picLocks noGrp="1" noChangeAspect="1"/>
+          </p:cNvPicPr>
+          <p:nvPr/>
+        </p:nvPicPr>
+        <p:blipFill>
+          <a:blip r:embed="rId2"/>
+          <a:stretch>
+            <a:fillRect/>
+          </a:stretch>
+        </p:blipFill>
+        <p:spPr bwMode="auto">
+          <a:xfrm>
+            <a:off x="3568700" y="952500"/>
+            <a:ext cx="5105400" cy="2870200"/>
+          </a:xfrm>
+          <a:prstGeom prst="rect">
+            <a:avLst/>
+          </a:prstGeom>
+          <a:noFill/>
+          <a:ln w="9525">
+            <a:noFill/>
+            <a:headEnd/>
+            <a:tailEnd/>
+          </a:ln>
+        </p:spPr>
+      </p:pic>
+    </p:spTree>
+  </p:cSld>
+</p:sld>
+</file>
+
+<file path=ppt/slides/slide13.xml><?xml version="1.0" encoding="utf-8"?>
+<p:sld xmlns:a="http://schemas.openxmlformats.org/drawingml/2006/main" xmlns:r="http://schemas.openxmlformats.org/officeDocument/2006/relationships" xmlns:p="http://schemas.openxmlformats.org/presentationml/2006/main">
+  <p:cSld>
+    <p:spTree>
+      <p:nvGrpSpPr>
+        <p:cNvPr id="1" name=""/>
+        <p:cNvGrpSpPr/>
+        <p:nvPr/>
+      </p:nvGrpSpPr>
+      <p:grpSpPr>
+        <a:xfrm>
+          <a:off x="0" y="0"/>
+          <a:ext cx="0" cy="0"/>
+          <a:chOff x="0" y="0"/>
+          <a:chExt cx="0" cy="0"/>
+        </a:xfrm>
+      </p:grpSpPr>
+      <p:sp>
+        <p:nvSpPr>
+          <p:cNvPr id="4" name="Text Placeholder 3"/>
+          <p:cNvSpPr>
+            <a:spLocks noGrp="1"/>
+          </p:cNvSpPr>
+          <p:nvPr>
+            <p:ph idx="2" sz="half" type="body"/>
+          </p:nvPr>
+        </p:nvSpPr>
+        <p:spPr/>
+        <p:txBody>
+          <a:bodyPr/>
+          <a:lstStyle/>
+          <a:p>
+            <a:pPr lvl="0" indent="0" marL="0">
+              <a:spcBef>
+                <a:spcPts val="3000"/>
+              </a:spcBef>
+              <a:buNone/>
+            </a:pPr>
+            <a:r>
+              <a:rPr b="1"/>
+              <a:t>test5</a:t>
+            </a:r>
+          </a:p>
+        </p:txBody>
+      </p:sp>
+      <p:pic>
+        <p:nvPicPr>
+          <p:cNvPr descr="https://github.com/ManuelePasini/slides-markdown/blob/master/slides/images/dataplat_seminar/agritech_ods.jpg?raw=true" id="0" name="Picture 1"/>
+          <p:cNvPicPr>
+            <a:picLocks noGrp="1" noChangeAspect="1"/>
+          </p:cNvPicPr>
+          <p:nvPr/>
+        </p:nvPicPr>
+        <p:blipFill>
+          <a:blip r:embed="rId2"/>
+          <a:stretch>
+            <a:fillRect/>
+          </a:stretch>
+        </p:blipFill>
+        <p:spPr bwMode="auto">
+          <a:xfrm>
+            <a:off x="3568700" y="952500"/>
+            <a:ext cx="5105400" cy="2870200"/>
+          </a:xfrm>
+          <a:prstGeom prst="rect">
+            <a:avLst/>
+          </a:prstGeom>
+          <a:noFill/>
+          <a:ln w="9525">
+            <a:noFill/>
+            <a:headEnd/>
+            <a:tailEnd/>
+          </a:ln>
+        </p:spPr>
+      </p:pic>
+    </p:spTree>
+  </p:cSld>
+</p:sld>
+</file>
+
+<file path=ppt/slides/slide14.xml><?xml version="1.0" encoding="utf-8"?>
+<p:sld xmlns:a="http://schemas.openxmlformats.org/drawingml/2006/main" xmlns:r="http://schemas.openxmlformats.org/officeDocument/2006/relationships" xmlns:p="http://schemas.openxmlformats.org/presentationml/2006/main">
+  <p:cSld>
+    <p:spTree>
+      <p:nvGrpSpPr>
+        <p:cNvPr id="1" name=""/>
+        <p:cNvGrpSpPr/>
+        <p:nvPr/>
+      </p:nvGrpSpPr>
+      <p:grpSpPr>
+        <a:xfrm>
+          <a:off x="0" y="0"/>
+          <a:ext cx="0" cy="0"/>
+          <a:chOff x="0" y="0"/>
+          <a:chExt cx="0" cy="0"/>
+        </a:xfrm>
+      </p:grpSpPr>
+      <p:sp>
+        <p:nvSpPr>
+          <p:cNvPr id="4" name="Text Placeholder 3"/>
+          <p:cNvSpPr>
+            <a:spLocks noGrp="1"/>
+          </p:cNvSpPr>
+          <p:nvPr>
+            <p:ph idx="2" sz="half" type="body"/>
+          </p:nvPr>
+        </p:nvSpPr>
+        <p:spPr/>
+        <p:txBody>
+          <a:bodyPr/>
+          <a:lstStyle/>
+          <a:p>
+            <a:pPr lvl="0" indent="0" marL="0">
+              <a:spcBef>
+                <a:spcPts val="3000"/>
+              </a:spcBef>
+              <a:buNone/>
+            </a:pPr>
+            <a:r>
+              <a:rPr b="1"/>
+              <a:t>test6</a:t>
+            </a:r>
+          </a:p>
+        </p:txBody>
+      </p:sp>
+      <p:pic>
+        <p:nvPicPr>
+          <p:cNvPr descr="https://github.com/ManuelePasini/slides-markdown/blob/master/slides/images/dataplat_seminar/top_view.jpg?raw=true" id="0" name="Picture 1"/>
+          <p:cNvPicPr>
+            <a:picLocks noGrp="1" noChangeAspect="1"/>
+          </p:cNvPicPr>
+          <p:nvPr/>
+        </p:nvPicPr>
+        <p:blipFill>
+          <a:blip r:embed="rId2"/>
+          <a:stretch>
+            <a:fillRect/>
+          </a:stretch>
+        </p:blipFill>
+        <p:spPr bwMode="auto">
+          <a:xfrm>
+            <a:off x="3568700" y="952500"/>
+            <a:ext cx="5105400" cy="2870200"/>
+          </a:xfrm>
+          <a:prstGeom prst="rect">
+            <a:avLst/>
+          </a:prstGeom>
+          <a:noFill/>
+          <a:ln w="9525">
+            <a:noFill/>
+            <a:headEnd/>
+            <a:tailEnd/>
+          </a:ln>
+        </p:spPr>
+      </p:pic>
+    </p:spTree>
+  </p:cSld>
+</p:sld>
+</file>
+
+<file path=ppt/slides/slide15.xml><?xml version="1.0" encoding="utf-8"?>
+<p:sld xmlns:a="http://schemas.openxmlformats.org/drawingml/2006/main" xmlns:r="http://schemas.openxmlformats.org/officeDocument/2006/relationships" xmlns:p="http://schemas.openxmlformats.org/presentationml/2006/main">
+  <p:cSld>
+    <p:spTree>
+      <p:nvGrpSpPr>
+        <p:cNvPr id="1" name=""/>
+        <p:cNvGrpSpPr/>
+        <p:nvPr/>
+      </p:nvGrpSpPr>
+      <p:grpSpPr>
+        <a:xfrm>
+          <a:off x="0" y="0"/>
+          <a:ext cx="0" cy="0"/>
+          <a:chOff x="0" y="0"/>
+          <a:chExt cx="0" cy="0"/>
+        </a:xfrm>
+      </p:grpSpPr>
+      <p:sp>
+        <p:nvSpPr>
+          <p:cNvPr id="4" name="Text Placeholder 3"/>
+          <p:cNvSpPr>
+            <a:spLocks noGrp="1"/>
+          </p:cNvSpPr>
+          <p:nvPr>
+            <p:ph idx="2" sz="half" type="body"/>
+          </p:nvPr>
+        </p:nvSpPr>
+        <p:spPr/>
+        <p:txBody>
+          <a:bodyPr/>
+          <a:lstStyle/>
+          <a:p>
+            <a:pPr lvl="0" indent="0" marL="0">
+              <a:spcBef>
+                <a:spcPts val="3000"/>
+              </a:spcBef>
+              <a:buNone/>
+            </a:pPr>
+            <a:r>
+              <a:rPr b="1"/>
+              <a:t>test7</a:t>
+            </a:r>
+          </a:p>
+        </p:txBody>
+      </p:sp>
+      <p:pic>
+        <p:nvPicPr>
+          <p:cNvPr descr="https://github.com/ManuelePasini/slides-markdown/blob/master/slides/images/dataplat_seminar/vert_view.jpg?raw=true" id="0" name="Picture 1"/>
+          <p:cNvPicPr>
+            <a:picLocks noGrp="1" noChangeAspect="1"/>
+          </p:cNvPicPr>
+          <p:nvPr/>
+        </p:nvPicPr>
+        <p:blipFill>
+          <a:blip r:embed="rId2"/>
+          <a:stretch>
+            <a:fillRect/>
+          </a:stretch>
+        </p:blipFill>
+        <p:spPr bwMode="auto">
+          <a:xfrm>
+            <a:off x="3568700" y="952500"/>
+            <a:ext cx="5105400" cy="2870200"/>
+          </a:xfrm>
+          <a:prstGeom prst="rect">
+            <a:avLst/>
+          </a:prstGeom>
+          <a:noFill/>
+          <a:ln w="9525">
+            <a:noFill/>
+            <a:headEnd/>
+            <a:tailEnd/>
+          </a:ln>
+        </p:spPr>
+      </p:pic>
+    </p:spTree>
+  </p:cSld>
+</p:sld>
+</file>
+
 <file path=ppt/slides/slide2.xml><?xml version="1.0" encoding="utf-8"?>
 <p:sld xmlns:a="http://schemas.openxmlformats.org/drawingml/2006/main" xmlns:r="http://schemas.openxmlformats.org/officeDocument/2006/relationships" xmlns:p="http://schemas.openxmlformats.org/presentationml/2006/main">
   <p:cSld>
@@ -4067,6 +4554,86 @@
           </a:p>
         </p:txBody>
       </p:sp>
+    </p:spTree>
+  </p:cSld>
+</p:sld>
+</file>
+
+<file path=ppt/slides/slide9.xml><?xml version="1.0" encoding="utf-8"?>
+<p:sld xmlns:a="http://schemas.openxmlformats.org/drawingml/2006/main" xmlns:r="http://schemas.openxmlformats.org/officeDocument/2006/relationships" xmlns:p="http://schemas.openxmlformats.org/presentationml/2006/main">
+  <p:cSld>
+    <p:spTree>
+      <p:nvGrpSpPr>
+        <p:cNvPr id="1" name=""/>
+        <p:cNvGrpSpPr/>
+        <p:nvPr/>
+      </p:nvGrpSpPr>
+      <p:grpSpPr>
+        <a:xfrm>
+          <a:off x="0" y="0"/>
+          <a:ext cx="0" cy="0"/>
+          <a:chOff x="0" y="0"/>
+          <a:chExt cx="0" cy="0"/>
+        </a:xfrm>
+      </p:grpSpPr>
+      <p:sp>
+        <p:nvSpPr>
+          <p:cNvPr id="4" name="Text Placeholder 3"/>
+          <p:cNvSpPr>
+            <a:spLocks noGrp="1"/>
+          </p:cNvSpPr>
+          <p:nvPr>
+            <p:ph idx="2" sz="half" type="body"/>
+          </p:nvPr>
+        </p:nvSpPr>
+        <p:spPr/>
+        <p:txBody>
+          <a:bodyPr/>
+          <a:lstStyle/>
+          <a:p>
+            <a:pPr lvl="0" indent="0" marL="0">
+              <a:spcBef>
+                <a:spcPts val="3000"/>
+              </a:spcBef>
+              <a:buNone/>
+            </a:pPr>
+            <a:r>
+              <a:rPr b="1"/>
+              <a:t>test1</a:t>
+            </a:r>
+          </a:p>
+        </p:txBody>
+      </p:sp>
+      <p:pic>
+        <p:nvPicPr>
+          <p:cNvPr descr="https://github.com/ManuelePasini/slides-markdown/blob/master/slides/images/dataplat_seminar/func_view.jpg?raw=true" id="0" name="Picture 1"/>
+          <p:cNvPicPr>
+            <a:picLocks noGrp="1" noChangeAspect="1"/>
+          </p:cNvPicPr>
+          <p:nvPr/>
+        </p:nvPicPr>
+        <p:blipFill>
+          <a:blip r:embed="rId2"/>
+          <a:stretch>
+            <a:fillRect/>
+          </a:stretch>
+        </p:blipFill>
+        <p:spPr bwMode="auto">
+          <a:xfrm>
+            <a:off x="4013200" y="203200"/>
+            <a:ext cx="4216400" cy="4381500"/>
+          </a:xfrm>
+          <a:prstGeom prst="rect">
+            <a:avLst/>
+          </a:prstGeom>
+          <a:noFill/>
+          <a:ln w="9525">
+            <a:noFill/>
+            <a:headEnd/>
+            <a:tailEnd/>
+          </a:ln>
+        </p:spPr>
+      </p:pic>
     </p:spTree>
   </p:cSld>
 </p:sld>

</xml_diff>

<commit_message>
Deploying to gh-pages from @ ManuelePasini/slides-markdown@3016e484061245a397c9af36551dffec4ae51738 🚀
</commit_message>
<xml_diff>
--- a/dataplat_seminar.pptx
+++ b/dataplat_seminar.pptx
@@ -5013,7 +5013,7 @@
             <a:pPr lvl="0"/>
             <a:r>
               <a:rPr/>
-              <a:t>Identified key aspects:</a:t>
+              <a:t>Identified data aspects:</a:t>
             </a:r>
           </a:p>
           <a:p>
@@ -5024,7 +5024,7 @@
             </a:r>
             <a:r>
               <a:rPr/>
-              <a:t>ariety: Vector, image, multispectral, and sensor data.</a:t>
+              <a:t>ariety: vector, image, multispectral, and sensor data.</a:t>
             </a:r>
           </a:p>
           <a:p>
@@ -5035,7 +5035,7 @@
             </a:r>
             <a:r>
               <a:rPr/>
-              <a:t>olume: From small sensor data to large drone missions.</a:t>
+              <a:t>olume: from small sensor data to large drone missions.</a:t>
             </a:r>
           </a:p>
           <a:p>
@@ -5046,14 +5046,14 @@
             </a:r>
             <a:r>
               <a:rPr/>
-              <a:t>eracity: Managing data quality from non-IT personnel.</a:t>
+              <a:t>eracity: manual collection and sharing.</a:t>
             </a:r>
           </a:p>
           <a:p>
             <a:pPr lvl="0"/>
             <a:r>
               <a:rPr/>
-              <a:t>Heterogeneous domain:</a:t>
+              <a:t>Domain analysis:</a:t>
             </a:r>
           </a:p>
           <a:p>
@@ -5074,14 +5074,14 @@
             <a:pPr lvl="1"/>
             <a:r>
               <a:rPr/>
-              <a:t>data collected in standalone excel files;</a:t>
+              <a:t>data in multiple excel files;</a:t>
             </a:r>
           </a:p>
           <a:p>
             <a:pPr lvl="1"/>
             <a:r>
               <a:rPr/>
-              <a:t>few-to-none common ground for interoperability.</a:t>
+              <a:t>No common ground for interoperability.</a:t>
             </a:r>
           </a:p>
           <a:p>

</xml_diff>

<commit_message>
Deploying to gh-pages from @ ManuelePasini/slides-markdown@1e73f22d89956a9f274cc1c7653ed202ce904f09 🚀
</commit_message>
<xml_diff>
--- a/dataplat_seminar.pptx
+++ b/dataplat_seminar.pptx
@@ -4194,7 +4194,7 @@
             </a:pPr>
             <a:r>
               <a:rPr/>
-              <a:t>Vertical view on BIG Data platform</a:t>
+              <a:t>Vertical view</a:t>
             </a:r>
           </a:p>
         </p:txBody>
@@ -5299,7 +5299,7 @@
             <a:pPr lvl="1"/>
             <a:r>
               <a:rPr/>
-              <a:t>adherence to </a:t>
+              <a:t>Governance through adherence to </a:t>
             </a:r>
             <a:r>
               <a:rPr>

</xml_diff>